<commit_message>
Some more presentation slides
</commit_message>
<xml_diff>
--- a/presentation/Abschlusspräsentation.pptx
+++ b/presentation/Abschlusspräsentation.pptx
@@ -6,8 +6,10 @@
   </p:sldMasterIdLst>
   <p:sldIdLst>
     <p:sldId id="256" r:id="rId2"/>
-    <p:sldId id="257" r:id="rId3"/>
-    <p:sldId id="258" r:id="rId4"/>
+    <p:sldId id="264" r:id="rId3"/>
+    <p:sldId id="259" r:id="rId4"/>
+    <p:sldId id="263" r:id="rId5"/>
+    <p:sldId id="265" r:id="rId6"/>
   </p:sldIdLst>
   <p:sldSz cx="12192000" cy="6858000"/>
   <p:notesSz cx="6858000" cy="9144000"/>
@@ -245,7 +247,7 @@
           <a:p>
             <a:fld id="{94CE6F9C-8138-ED4D-AC4A-D3C3EB29335E}" type="datetimeFigureOut">
               <a:rPr lang="de-DE" smtClean="0"/>
-              <a:t>30.06.16</a:t>
+              <a:t>04.07.16</a:t>
             </a:fld>
             <a:endParaRPr lang="de-DE"/>
           </a:p>
@@ -415,7 +417,7 @@
           <a:p>
             <a:fld id="{94CE6F9C-8138-ED4D-AC4A-D3C3EB29335E}" type="datetimeFigureOut">
               <a:rPr lang="de-DE" smtClean="0"/>
-              <a:t>30.06.16</a:t>
+              <a:t>04.07.16</a:t>
             </a:fld>
             <a:endParaRPr lang="de-DE"/>
           </a:p>
@@ -595,7 +597,7 @@
           <a:p>
             <a:fld id="{94CE6F9C-8138-ED4D-AC4A-D3C3EB29335E}" type="datetimeFigureOut">
               <a:rPr lang="de-DE" smtClean="0"/>
-              <a:t>30.06.16</a:t>
+              <a:t>04.07.16</a:t>
             </a:fld>
             <a:endParaRPr lang="de-DE"/>
           </a:p>
@@ -765,7 +767,7 @@
           <a:p>
             <a:fld id="{94CE6F9C-8138-ED4D-AC4A-D3C3EB29335E}" type="datetimeFigureOut">
               <a:rPr lang="de-DE" smtClean="0"/>
-              <a:t>30.06.16</a:t>
+              <a:t>04.07.16</a:t>
             </a:fld>
             <a:endParaRPr lang="de-DE"/>
           </a:p>
@@ -1011,7 +1013,7 @@
           <a:p>
             <a:fld id="{94CE6F9C-8138-ED4D-AC4A-D3C3EB29335E}" type="datetimeFigureOut">
               <a:rPr lang="de-DE" smtClean="0"/>
-              <a:t>30.06.16</a:t>
+              <a:t>04.07.16</a:t>
             </a:fld>
             <a:endParaRPr lang="de-DE"/>
           </a:p>
@@ -1243,7 +1245,7 @@
           <a:p>
             <a:fld id="{94CE6F9C-8138-ED4D-AC4A-D3C3EB29335E}" type="datetimeFigureOut">
               <a:rPr lang="de-DE" smtClean="0"/>
-              <a:t>30.06.16</a:t>
+              <a:t>04.07.16</a:t>
             </a:fld>
             <a:endParaRPr lang="de-DE"/>
           </a:p>
@@ -1610,7 +1612,7 @@
           <a:p>
             <a:fld id="{94CE6F9C-8138-ED4D-AC4A-D3C3EB29335E}" type="datetimeFigureOut">
               <a:rPr lang="de-DE" smtClean="0"/>
-              <a:t>30.06.16</a:t>
+              <a:t>04.07.16</a:t>
             </a:fld>
             <a:endParaRPr lang="de-DE"/>
           </a:p>
@@ -1728,7 +1730,7 @@
           <a:p>
             <a:fld id="{94CE6F9C-8138-ED4D-AC4A-D3C3EB29335E}" type="datetimeFigureOut">
               <a:rPr lang="de-DE" smtClean="0"/>
-              <a:t>30.06.16</a:t>
+              <a:t>04.07.16</a:t>
             </a:fld>
             <a:endParaRPr lang="de-DE"/>
           </a:p>
@@ -1823,7 +1825,7 @@
           <a:p>
             <a:fld id="{94CE6F9C-8138-ED4D-AC4A-D3C3EB29335E}" type="datetimeFigureOut">
               <a:rPr lang="de-DE" smtClean="0"/>
-              <a:t>30.06.16</a:t>
+              <a:t>04.07.16</a:t>
             </a:fld>
             <a:endParaRPr lang="de-DE"/>
           </a:p>
@@ -2100,7 +2102,7 @@
           <a:p>
             <a:fld id="{94CE6F9C-8138-ED4D-AC4A-D3C3EB29335E}" type="datetimeFigureOut">
               <a:rPr lang="de-DE" smtClean="0"/>
-              <a:t>30.06.16</a:t>
+              <a:t>04.07.16</a:t>
             </a:fld>
             <a:endParaRPr lang="de-DE"/>
           </a:p>
@@ -2353,7 +2355,7 @@
           <a:p>
             <a:fld id="{94CE6F9C-8138-ED4D-AC4A-D3C3EB29335E}" type="datetimeFigureOut">
               <a:rPr lang="de-DE" smtClean="0"/>
-              <a:t>30.06.16</a:t>
+              <a:t>04.07.16</a:t>
             </a:fld>
             <a:endParaRPr lang="de-DE"/>
           </a:p>
@@ -2566,7 +2568,7 @@
           <a:p>
             <a:fld id="{94CE6F9C-8138-ED4D-AC4A-D3C3EB29335E}" type="datetimeFigureOut">
               <a:rPr lang="de-DE" smtClean="0"/>
-              <a:t>30.06.16</a:t>
+              <a:t>04.07.16</a:t>
             </a:fld>
             <a:endParaRPr lang="de-DE"/>
           </a:p>
@@ -3122,7 +3124,7 @@
                     <a:ea typeface="Corbel" charset="0"/>
                     <a:cs typeface="Corbel" charset="0"/>
                   </a:rPr>
-                  <a:t>HCI-Abschlussprojekt</a:t>
+                  <a:t>HCI Final Project</a:t>
                 </a:r>
                 <a:endParaRPr lang="en-US" sz="2600" dirty="0">
                   <a:solidFill>
@@ -3425,97 +3427,6 @@
           <a:chExt cx="0" cy="0"/>
         </a:xfrm>
       </p:grpSpPr>
-      <p:sp>
-        <p:nvSpPr>
-          <p:cNvPr id="4" name="Rechteck 3"/>
-          <p:cNvSpPr/>
-          <p:nvPr/>
-        </p:nvSpPr>
-        <p:spPr>
-          <a:xfrm>
-            <a:off x="2441007" y="97443"/>
-            <a:ext cx="6534000" cy="1149464"/>
-          </a:xfrm>
-          <a:prstGeom prst="rect">
-            <a:avLst/>
-          </a:prstGeom>
-          <a:solidFill>
-            <a:srgbClr val="5B7CB6"/>
-          </a:solidFill>
-          <a:ln>
-            <a:noFill/>
-          </a:ln>
-        </p:spPr>
-        <p:style>
-          <a:lnRef idx="2">
-            <a:schemeClr val="accent1">
-              <a:shade val="50000"/>
-            </a:schemeClr>
-          </a:lnRef>
-          <a:fillRef idx="1">
-            <a:schemeClr val="accent1"/>
-          </a:fillRef>
-          <a:effectRef idx="0">
-            <a:schemeClr val="accent1"/>
-          </a:effectRef>
-          <a:fontRef idx="minor">
-            <a:schemeClr val="lt1"/>
-          </a:fontRef>
-        </p:style>
-        <p:txBody>
-          <a:bodyPr rtlCol="0" anchor="ctr"/>
-          <a:lstStyle/>
-          <a:p>
-            <a:pPr algn="ctr"/>
-            <a:endParaRPr lang="de-DE"/>
-          </a:p>
-        </p:txBody>
-      </p:sp>
-      <p:sp>
-        <p:nvSpPr>
-          <p:cNvPr id="7" name="Textfeld 6"/>
-          <p:cNvSpPr txBox="1"/>
-          <p:nvPr/>
-        </p:nvSpPr>
-        <p:spPr>
-          <a:xfrm>
-            <a:off x="2701636" y="349009"/>
-            <a:ext cx="6040582" cy="646331"/>
-          </a:xfrm>
-          <a:prstGeom prst="rect">
-            <a:avLst/>
-          </a:prstGeom>
-          <a:noFill/>
-        </p:spPr>
-        <p:txBody>
-          <a:bodyPr wrap="square" rtlCol="0">
-            <a:spAutoFit/>
-          </a:bodyPr>
-          <a:lstStyle/>
-          <a:p>
-            <a:pPr algn="ctr"/>
-            <a:r>
-              <a:rPr lang="de-DE" sz="3600" dirty="0" smtClean="0">
-                <a:solidFill>
-                  <a:schemeClr val="bg1"/>
-                </a:solidFill>
-                <a:latin typeface="Corbel" charset="0"/>
-                <a:ea typeface="Corbel" charset="0"/>
-                <a:cs typeface="Corbel" charset="0"/>
-              </a:rPr>
-              <a:t>Spielkonzept</a:t>
-            </a:r>
-            <a:endParaRPr lang="en-US" sz="3600" dirty="0">
-              <a:solidFill>
-                <a:schemeClr val="bg1"/>
-              </a:solidFill>
-              <a:latin typeface="Corbel" charset="0"/>
-              <a:ea typeface="Corbel" charset="0"/>
-              <a:cs typeface="Corbel" charset="0"/>
-            </a:endParaRPr>
-          </a:p>
-        </p:txBody>
-      </p:sp>
       <p:pic>
         <p:nvPicPr>
           <p:cNvPr id="8" name="Bild 7"/>
@@ -3548,6 +3459,333 @@
       </p:pic>
       <p:pic>
         <p:nvPicPr>
+          <p:cNvPr id="17" name="Bild 16"/>
+          <p:cNvPicPr>
+            <a:picLocks noChangeAspect="1"/>
+          </p:cNvPicPr>
+          <p:nvPr/>
+        </p:nvPicPr>
+        <p:blipFill>
+          <a:blip r:embed="rId3">
+            <a:extLst>
+              <a:ext uri="{28A0092B-C50C-407E-A947-70E740481C1C}">
+                <a14:useLocalDpi xmlns:a14="http://schemas.microsoft.com/office/drawing/2010/main" val="0"/>
+              </a:ext>
+            </a:extLst>
+          </a:blip>
+          <a:stretch>
+            <a:fillRect/>
+          </a:stretch>
+        </p:blipFill>
+        <p:spPr>
+          <a:xfrm>
+            <a:off x="111138" y="1293238"/>
+            <a:ext cx="3989808" cy="4518000"/>
+          </a:xfrm>
+          <a:prstGeom prst="rect">
+            <a:avLst/>
+          </a:prstGeom>
+        </p:spPr>
+      </p:pic>
+      <p:pic>
+        <p:nvPicPr>
+          <p:cNvPr id="3" name="Bild 2"/>
+          <p:cNvPicPr>
+            <a:picLocks noChangeAspect="1"/>
+          </p:cNvPicPr>
+          <p:nvPr/>
+        </p:nvPicPr>
+        <p:blipFill>
+          <a:blip r:embed="rId4">
+            <a:alphaModFix amt="50000"/>
+            <a:extLst>
+              <a:ext uri="{28A0092B-C50C-407E-A947-70E740481C1C}">
+                <a14:useLocalDpi xmlns:a14="http://schemas.microsoft.com/office/drawing/2010/main" val="0"/>
+              </a:ext>
+            </a:extLst>
+          </a:blip>
+          <a:stretch>
+            <a:fillRect/>
+          </a:stretch>
+        </p:blipFill>
+        <p:spPr>
+          <a:xfrm>
+            <a:off x="1620982" y="3163736"/>
+            <a:ext cx="1080654" cy="1080654"/>
+          </a:xfrm>
+          <a:prstGeom prst="rect">
+            <a:avLst/>
+          </a:prstGeom>
+        </p:spPr>
+      </p:pic>
+      <p:pic>
+        <p:nvPicPr>
+          <p:cNvPr id="19" name="Bild 18"/>
+          <p:cNvPicPr>
+            <a:picLocks noChangeAspect="1"/>
+          </p:cNvPicPr>
+          <p:nvPr/>
+        </p:nvPicPr>
+        <p:blipFill>
+          <a:blip r:embed="rId3">
+            <a:extLst>
+              <a:ext uri="{28A0092B-C50C-407E-A947-70E740481C1C}">
+                <a14:useLocalDpi xmlns:a14="http://schemas.microsoft.com/office/drawing/2010/main" val="0"/>
+              </a:ext>
+            </a:extLst>
+          </a:blip>
+          <a:stretch>
+            <a:fillRect/>
+          </a:stretch>
+        </p:blipFill>
+        <p:spPr>
+          <a:xfrm>
+            <a:off x="4156361" y="1293236"/>
+            <a:ext cx="6753791" cy="4506356"/>
+          </a:xfrm>
+          <a:prstGeom prst="rect">
+            <a:avLst/>
+          </a:prstGeom>
+        </p:spPr>
+      </p:pic>
+      <p:sp>
+        <p:nvSpPr>
+          <p:cNvPr id="30" name="Rechteck 29"/>
+          <p:cNvSpPr/>
+          <p:nvPr/>
+        </p:nvSpPr>
+        <p:spPr>
+          <a:xfrm rot="20901553">
+            <a:off x="5924214" y="4627879"/>
+            <a:ext cx="1787237" cy="1701301"/>
+          </a:xfrm>
+          <a:prstGeom prst="rect">
+            <a:avLst/>
+          </a:prstGeom>
+          <a:solidFill>
+            <a:srgbClr val="FFFFFF">
+              <a:alpha val="80000"/>
+            </a:srgbClr>
+          </a:solidFill>
+          <a:ln w="3175">
+            <a:solidFill>
+              <a:schemeClr val="bg1"/>
+            </a:solidFill>
+          </a:ln>
+        </p:spPr>
+        <p:style>
+          <a:lnRef idx="2">
+            <a:schemeClr val="accent1">
+              <a:shade val="50000"/>
+            </a:schemeClr>
+          </a:lnRef>
+          <a:fillRef idx="1">
+            <a:schemeClr val="accent1"/>
+          </a:fillRef>
+          <a:effectRef idx="0">
+            <a:schemeClr val="accent1"/>
+          </a:effectRef>
+          <a:fontRef idx="minor">
+            <a:schemeClr val="lt1"/>
+          </a:fontRef>
+        </p:style>
+        <p:txBody>
+          <a:bodyPr rtlCol="0" anchor="ctr"/>
+          <a:lstStyle/>
+          <a:p>
+            <a:pPr algn="ctr"/>
+            <a:endParaRPr lang="de-DE"/>
+          </a:p>
+        </p:txBody>
+      </p:sp>
+      <p:grpSp>
+        <p:nvGrpSpPr>
+          <p:cNvPr id="31" name="Gruppierung 30"/>
+          <p:cNvGrpSpPr/>
+          <p:nvPr/>
+        </p:nvGrpSpPr>
+        <p:grpSpPr>
+          <a:xfrm>
+            <a:off x="111136" y="5841380"/>
+            <a:ext cx="6174000" cy="909708"/>
+            <a:chOff x="111136" y="5841380"/>
+            <a:chExt cx="6174000" cy="909708"/>
+          </a:xfrm>
+        </p:grpSpPr>
+        <p:sp>
+          <p:nvSpPr>
+            <p:cNvPr id="12" name="Rechteck 11"/>
+            <p:cNvSpPr/>
+            <p:nvPr/>
+          </p:nvSpPr>
+          <p:spPr>
+            <a:xfrm>
+              <a:off x="111136" y="5841380"/>
+              <a:ext cx="6174000" cy="909708"/>
+            </a:xfrm>
+            <a:prstGeom prst="rect">
+              <a:avLst/>
+            </a:prstGeom>
+            <a:solidFill>
+              <a:srgbClr val="2894D9"/>
+            </a:solidFill>
+            <a:ln>
+              <a:noFill/>
+            </a:ln>
+          </p:spPr>
+          <p:style>
+            <a:lnRef idx="2">
+              <a:schemeClr val="accent1">
+                <a:shade val="50000"/>
+              </a:schemeClr>
+            </a:lnRef>
+            <a:fillRef idx="1">
+              <a:schemeClr val="accent1"/>
+            </a:fillRef>
+            <a:effectRef idx="0">
+              <a:schemeClr val="accent1"/>
+            </a:effectRef>
+            <a:fontRef idx="minor">
+              <a:schemeClr val="lt1"/>
+            </a:fontRef>
+          </p:style>
+          <p:txBody>
+            <a:bodyPr rtlCol="0" anchor="ctr"/>
+            <a:lstStyle/>
+            <a:p>
+              <a:pPr algn="ctr"/>
+              <a:endParaRPr lang="de-DE"/>
+            </a:p>
+          </p:txBody>
+        </p:sp>
+        <p:sp>
+          <p:nvSpPr>
+            <p:cNvPr id="2" name="Textfeld 1"/>
+            <p:cNvSpPr txBox="1"/>
+            <p:nvPr/>
+          </p:nvSpPr>
+          <p:spPr>
+            <a:xfrm>
+              <a:off x="640390" y="6111568"/>
+              <a:ext cx="5067616" cy="369332"/>
+            </a:xfrm>
+            <a:prstGeom prst="rect">
+              <a:avLst/>
+            </a:prstGeom>
+            <a:noFill/>
+          </p:spPr>
+          <p:txBody>
+            <a:bodyPr wrap="square" rtlCol="0">
+              <a:spAutoFit/>
+            </a:bodyPr>
+            <a:lstStyle/>
+            <a:p>
+              <a:pPr algn="ctr"/>
+              <a:r>
+                <a:rPr lang="en-US" b="1" dirty="0" smtClean="0">
+                  <a:solidFill>
+                    <a:schemeClr val="bg1"/>
+                  </a:solidFill>
+                  <a:latin typeface="Corbel" charset="0"/>
+                  <a:ea typeface="Corbel" charset="0"/>
+                  <a:cs typeface="Corbel" charset="0"/>
+                </a:rPr>
+                <a:t>Don’t crash with an Ice Block!</a:t>
+              </a:r>
+              <a:endParaRPr lang="en-US" b="1" dirty="0">
+                <a:solidFill>
+                  <a:schemeClr val="bg1"/>
+                </a:solidFill>
+                <a:latin typeface="Corbel" charset="0"/>
+                <a:ea typeface="Corbel" charset="0"/>
+                <a:cs typeface="Corbel" charset="0"/>
+              </a:endParaRPr>
+            </a:p>
+          </p:txBody>
+        </p:sp>
+      </p:grpSp>
+      <p:pic>
+        <p:nvPicPr>
+          <p:cNvPr id="10" name="Bild 9"/>
+          <p:cNvPicPr>
+            <a:picLocks noChangeAspect="1"/>
+          </p:cNvPicPr>
+          <p:nvPr/>
+        </p:nvPicPr>
+        <p:blipFill>
+          <a:blip r:embed="rId3">
+            <a:extLst>
+              <a:ext uri="{28A0092B-C50C-407E-A947-70E740481C1C}">
+                <a14:useLocalDpi xmlns:a14="http://schemas.microsoft.com/office/drawing/2010/main" val="0"/>
+              </a:ext>
+            </a:extLst>
+          </a:blip>
+          <a:stretch>
+            <a:fillRect/>
+          </a:stretch>
+        </p:blipFill>
+        <p:spPr>
+          <a:xfrm>
+            <a:off x="6317970" y="5841380"/>
+            <a:ext cx="5777048" cy="909708"/>
+          </a:xfrm>
+          <a:prstGeom prst="rect">
+            <a:avLst/>
+          </a:prstGeom>
+        </p:spPr>
+      </p:pic>
+      <p:sp>
+        <p:nvSpPr>
+          <p:cNvPr id="32" name="Rechteck 31"/>
+          <p:cNvSpPr/>
+          <p:nvPr/>
+        </p:nvSpPr>
+        <p:spPr>
+          <a:xfrm rot="163457">
+            <a:off x="9040300" y="1582050"/>
+            <a:ext cx="1559036" cy="1484073"/>
+          </a:xfrm>
+          <a:prstGeom prst="rect">
+            <a:avLst/>
+          </a:prstGeom>
+          <a:solidFill>
+            <a:srgbClr val="FFFFFF">
+              <a:alpha val="80000"/>
+            </a:srgbClr>
+          </a:solidFill>
+          <a:ln w="3175">
+            <a:solidFill>
+              <a:schemeClr val="bg1"/>
+            </a:solidFill>
+          </a:ln>
+        </p:spPr>
+        <p:style>
+          <a:lnRef idx="2">
+            <a:schemeClr val="accent1">
+              <a:shade val="50000"/>
+            </a:schemeClr>
+          </a:lnRef>
+          <a:fillRef idx="1">
+            <a:schemeClr val="accent1"/>
+          </a:fillRef>
+          <a:effectRef idx="0">
+            <a:schemeClr val="accent1"/>
+          </a:effectRef>
+          <a:fontRef idx="minor">
+            <a:schemeClr val="lt1"/>
+          </a:fontRef>
+        </p:style>
+        <p:txBody>
+          <a:bodyPr rtlCol="0" anchor="ctr"/>
+          <a:lstStyle/>
+          <a:p>
+            <a:pPr algn="ctr"/>
+            <a:endParaRPr lang="de-DE"/>
+          </a:p>
+        </p:txBody>
+      </p:sp>
+      <p:pic>
+        <p:nvPicPr>
           <p:cNvPr id="9" name="Bild 8"/>
           <p:cNvPicPr>
             <a:picLocks noChangeAspect="1"/>
@@ -3576,10 +3814,565 @@
           </a:prstGeom>
         </p:spPr>
       </p:pic>
+      <p:grpSp>
+        <p:nvGrpSpPr>
+          <p:cNvPr id="33" name="Gruppierung 32"/>
+          <p:cNvGrpSpPr/>
+          <p:nvPr/>
+        </p:nvGrpSpPr>
+        <p:grpSpPr>
+          <a:xfrm>
+            <a:off x="2441007" y="97443"/>
+            <a:ext cx="6534000" cy="1149464"/>
+            <a:chOff x="2441007" y="97443"/>
+            <a:chExt cx="6534000" cy="1149464"/>
+          </a:xfrm>
+        </p:grpSpPr>
+        <p:sp>
+          <p:nvSpPr>
+            <p:cNvPr id="4" name="Rechteck 3"/>
+            <p:cNvSpPr/>
+            <p:nvPr/>
+          </p:nvSpPr>
+          <p:spPr>
+            <a:xfrm>
+              <a:off x="2441007" y="97443"/>
+              <a:ext cx="6534000" cy="1149464"/>
+            </a:xfrm>
+            <a:prstGeom prst="rect">
+              <a:avLst/>
+            </a:prstGeom>
+            <a:solidFill>
+              <a:srgbClr val="5B7CB6"/>
+            </a:solidFill>
+            <a:ln>
+              <a:noFill/>
+            </a:ln>
+          </p:spPr>
+          <p:style>
+            <a:lnRef idx="2">
+              <a:schemeClr val="accent1">
+                <a:shade val="50000"/>
+              </a:schemeClr>
+            </a:lnRef>
+            <a:fillRef idx="1">
+              <a:schemeClr val="accent1"/>
+            </a:fillRef>
+            <a:effectRef idx="0">
+              <a:schemeClr val="accent1"/>
+            </a:effectRef>
+            <a:fontRef idx="minor">
+              <a:schemeClr val="lt1"/>
+            </a:fontRef>
+          </p:style>
+          <p:txBody>
+            <a:bodyPr rtlCol="0" anchor="ctr"/>
+            <a:lstStyle/>
+            <a:p>
+              <a:pPr algn="ctr"/>
+              <a:endParaRPr lang="en-US" dirty="0"/>
+            </a:p>
+          </p:txBody>
+        </p:sp>
+        <p:sp>
+          <p:nvSpPr>
+            <p:cNvPr id="7" name="Textfeld 6"/>
+            <p:cNvSpPr txBox="1"/>
+            <p:nvPr/>
+          </p:nvSpPr>
+          <p:spPr>
+            <a:xfrm>
+              <a:off x="2701636" y="349009"/>
+              <a:ext cx="6040582" cy="646331"/>
+            </a:xfrm>
+            <a:prstGeom prst="rect">
+              <a:avLst/>
+            </a:prstGeom>
+            <a:noFill/>
+          </p:spPr>
+          <p:txBody>
+            <a:bodyPr wrap="square" rtlCol="0">
+              <a:spAutoFit/>
+            </a:bodyPr>
+            <a:lstStyle/>
+            <a:p>
+              <a:pPr algn="ctr"/>
+              <a:r>
+                <a:rPr lang="en-US" sz="3600" dirty="0" smtClean="0">
+                  <a:solidFill>
+                    <a:schemeClr val="bg1"/>
+                  </a:solidFill>
+                  <a:latin typeface="Corbel" charset="0"/>
+                  <a:ea typeface="Corbel" charset="0"/>
+                  <a:cs typeface="Corbel" charset="0"/>
+                </a:rPr>
+                <a:t>Game Concept</a:t>
+              </a:r>
+              <a:endParaRPr lang="en-US" sz="3600" dirty="0" smtClean="0">
+                <a:solidFill>
+                  <a:schemeClr val="bg1"/>
+                </a:solidFill>
+                <a:latin typeface="Corbel" charset="0"/>
+                <a:ea typeface="Corbel" charset="0"/>
+                <a:cs typeface="Corbel" charset="0"/>
+              </a:endParaRPr>
+            </a:p>
+          </p:txBody>
+        </p:sp>
+      </p:grpSp>
+      <p:sp>
+        <p:nvSpPr>
+          <p:cNvPr id="36" name="Pfeil nach rechts 35"/>
+          <p:cNvSpPr/>
+          <p:nvPr/>
+        </p:nvSpPr>
+        <p:spPr>
+          <a:xfrm rot="10800000">
+            <a:off x="7627373" y="2289668"/>
+            <a:ext cx="899087" cy="253047"/>
+          </a:xfrm>
+          <a:prstGeom prst="rightArrow">
+            <a:avLst/>
+          </a:prstGeom>
+          <a:solidFill>
+            <a:srgbClr val="FFFFFF">
+              <a:alpha val="29804"/>
+            </a:srgbClr>
+          </a:solidFill>
+          <a:ln>
+            <a:noFill/>
+          </a:ln>
+        </p:spPr>
+        <p:style>
+          <a:lnRef idx="2">
+            <a:schemeClr val="accent1">
+              <a:shade val="50000"/>
+            </a:schemeClr>
+          </a:lnRef>
+          <a:fillRef idx="1">
+            <a:schemeClr val="accent1"/>
+          </a:fillRef>
+          <a:effectRef idx="0">
+            <a:schemeClr val="accent1"/>
+          </a:effectRef>
+          <a:fontRef idx="minor">
+            <a:schemeClr val="lt1"/>
+          </a:fontRef>
+        </p:style>
+        <p:txBody>
+          <a:bodyPr rtlCol="0" anchor="ctr"/>
+          <a:lstStyle/>
+          <a:p>
+            <a:pPr algn="ctr"/>
+            <a:endParaRPr lang="de-DE"/>
+          </a:p>
+        </p:txBody>
+      </p:sp>
+      <p:sp>
+        <p:nvSpPr>
+          <p:cNvPr id="37" name="Pfeil nach rechts 36"/>
+          <p:cNvSpPr/>
+          <p:nvPr/>
+        </p:nvSpPr>
+        <p:spPr>
+          <a:xfrm rot="5400000">
+            <a:off x="1859277" y="4795544"/>
+            <a:ext cx="692996" cy="252000"/>
+          </a:xfrm>
+          <a:prstGeom prst="rightArrow">
+            <a:avLst/>
+          </a:prstGeom>
+          <a:solidFill>
+            <a:srgbClr val="FFFFFF">
+              <a:alpha val="29804"/>
+            </a:srgbClr>
+          </a:solidFill>
+          <a:ln>
+            <a:noFill/>
+          </a:ln>
+        </p:spPr>
+        <p:style>
+          <a:lnRef idx="2">
+            <a:schemeClr val="accent1">
+              <a:shade val="50000"/>
+            </a:schemeClr>
+          </a:lnRef>
+          <a:fillRef idx="1">
+            <a:schemeClr val="accent1"/>
+          </a:fillRef>
+          <a:effectRef idx="0">
+            <a:schemeClr val="accent1"/>
+          </a:effectRef>
+          <a:fontRef idx="minor">
+            <a:schemeClr val="lt1"/>
+          </a:fontRef>
+        </p:style>
+        <p:txBody>
+          <a:bodyPr rtlCol="0" anchor="ctr"/>
+          <a:lstStyle/>
+          <a:p>
+            <a:pPr algn="ctr"/>
+            <a:endParaRPr lang="de-DE"/>
+          </a:p>
+        </p:txBody>
+      </p:sp>
+      <p:sp>
+        <p:nvSpPr>
+          <p:cNvPr id="38" name="Pfeil nach rechts 37"/>
+          <p:cNvSpPr/>
+          <p:nvPr/>
+        </p:nvSpPr>
+        <p:spPr>
+          <a:xfrm rot="10800000">
+            <a:off x="4433323" y="5092543"/>
+            <a:ext cx="899087" cy="253047"/>
+          </a:xfrm>
+          <a:prstGeom prst="rightArrow">
+            <a:avLst/>
+          </a:prstGeom>
+          <a:solidFill>
+            <a:srgbClr val="FFFFFF">
+              <a:alpha val="29804"/>
+            </a:srgbClr>
+          </a:solidFill>
+          <a:ln>
+            <a:noFill/>
+          </a:ln>
+        </p:spPr>
+        <p:style>
+          <a:lnRef idx="2">
+            <a:schemeClr val="accent1">
+              <a:shade val="50000"/>
+            </a:schemeClr>
+          </a:lnRef>
+          <a:fillRef idx="1">
+            <a:schemeClr val="accent1"/>
+          </a:fillRef>
+          <a:effectRef idx="0">
+            <a:schemeClr val="accent1"/>
+          </a:effectRef>
+          <a:fontRef idx="minor">
+            <a:schemeClr val="lt1"/>
+          </a:fontRef>
+        </p:style>
+        <p:txBody>
+          <a:bodyPr rtlCol="0" anchor="ctr"/>
+          <a:lstStyle/>
+          <a:p>
+            <a:pPr algn="ctr"/>
+            <a:endParaRPr lang="de-DE"/>
+          </a:p>
+        </p:txBody>
+      </p:sp>
+      <p:sp>
+        <p:nvSpPr>
+          <p:cNvPr id="39" name="Pfeil nach rechts 38"/>
+          <p:cNvSpPr/>
+          <p:nvPr/>
+        </p:nvSpPr>
+        <p:spPr>
+          <a:xfrm rot="16200000">
+            <a:off x="1859277" y="2416715"/>
+            <a:ext cx="692996" cy="252000"/>
+          </a:xfrm>
+          <a:prstGeom prst="rightArrow">
+            <a:avLst/>
+          </a:prstGeom>
+          <a:solidFill>
+            <a:srgbClr val="FFFFFF">
+              <a:alpha val="69804"/>
+            </a:srgbClr>
+          </a:solidFill>
+          <a:ln>
+            <a:noFill/>
+          </a:ln>
+        </p:spPr>
+        <p:style>
+          <a:lnRef idx="2">
+            <a:schemeClr val="accent1">
+              <a:shade val="50000"/>
+            </a:schemeClr>
+          </a:lnRef>
+          <a:fillRef idx="1">
+            <a:schemeClr val="accent1"/>
+          </a:fillRef>
+          <a:effectRef idx="0">
+            <a:schemeClr val="accent1"/>
+          </a:effectRef>
+          <a:fontRef idx="minor">
+            <a:schemeClr val="lt1"/>
+          </a:fontRef>
+        </p:style>
+        <p:txBody>
+          <a:bodyPr rtlCol="0" anchor="ctr"/>
+          <a:lstStyle/>
+          <a:p>
+            <a:pPr algn="ctr"/>
+            <a:endParaRPr lang="de-DE"/>
+          </a:p>
+        </p:txBody>
+      </p:sp>
+      <p:grpSp>
+        <p:nvGrpSpPr>
+          <p:cNvPr id="46" name="Gruppierung 45"/>
+          <p:cNvGrpSpPr/>
+          <p:nvPr/>
+        </p:nvGrpSpPr>
+        <p:grpSpPr>
+          <a:xfrm>
+            <a:off x="10965575" y="1293236"/>
+            <a:ext cx="1129444" cy="4518001"/>
+            <a:chOff x="10965575" y="1293236"/>
+            <a:chExt cx="1129444" cy="4518001"/>
+          </a:xfrm>
+        </p:grpSpPr>
+        <p:pic>
+          <p:nvPicPr>
+            <p:cNvPr id="23" name="Bild 22"/>
+            <p:cNvPicPr>
+              <a:picLocks noChangeAspect="1"/>
+            </p:cNvPicPr>
+            <p:nvPr/>
+          </p:nvPicPr>
+          <p:blipFill>
+            <a:blip r:embed="rId3">
+              <a:extLst>
+                <a:ext uri="{28A0092B-C50C-407E-A947-70E740481C1C}">
+                  <a14:useLocalDpi xmlns:a14="http://schemas.microsoft.com/office/drawing/2010/main" val="0"/>
+                </a:ext>
+              </a:extLst>
+            </a:blip>
+            <a:stretch>
+              <a:fillRect/>
+            </a:stretch>
+          </p:blipFill>
+          <p:spPr>
+            <a:xfrm rot="16200000">
+              <a:off x="9271296" y="2987515"/>
+              <a:ext cx="4518001" cy="1129444"/>
+            </a:xfrm>
+            <a:prstGeom prst="rect">
+              <a:avLst/>
+            </a:prstGeom>
+          </p:spPr>
+        </p:pic>
+        <p:pic>
+          <p:nvPicPr>
+            <p:cNvPr id="40" name="Bild 39"/>
+            <p:cNvPicPr>
+              <a:picLocks noChangeAspect="1"/>
+            </p:cNvPicPr>
+            <p:nvPr/>
+          </p:nvPicPr>
+          <p:blipFill>
+            <a:blip r:embed="rId5">
+              <a:extLst>
+                <a:ext uri="{28A0092B-C50C-407E-A947-70E740481C1C}">
+                  <a14:useLocalDpi xmlns:a14="http://schemas.microsoft.com/office/drawing/2010/main" val="0"/>
+                </a:ext>
+              </a:extLst>
+            </a:blip>
+            <a:stretch>
+              <a:fillRect/>
+            </a:stretch>
+          </p:blipFill>
+          <p:spPr>
+            <a:xfrm rot="16200000">
+              <a:off x="11335724" y="5092543"/>
+              <a:ext cx="369453" cy="369453"/>
+            </a:xfrm>
+            <a:prstGeom prst="rect">
+              <a:avLst/>
+            </a:prstGeom>
+          </p:spPr>
+        </p:pic>
+        <p:pic>
+          <p:nvPicPr>
+            <p:cNvPr id="41" name="Bild 40"/>
+            <p:cNvPicPr>
+              <a:picLocks noChangeAspect="1"/>
+            </p:cNvPicPr>
+            <p:nvPr/>
+          </p:nvPicPr>
+          <p:blipFill>
+            <a:blip r:embed="rId5">
+              <a:extLst>
+                <a:ext uri="{28A0092B-C50C-407E-A947-70E740481C1C}">
+                  <a14:useLocalDpi xmlns:a14="http://schemas.microsoft.com/office/drawing/2010/main" val="0"/>
+                </a:ext>
+              </a:extLst>
+            </a:blip>
+            <a:stretch>
+              <a:fillRect/>
+            </a:stretch>
+          </p:blipFill>
+          <p:spPr>
+            <a:xfrm rot="16200000">
+              <a:off x="11335725" y="4581152"/>
+              <a:ext cx="369453" cy="369453"/>
+            </a:xfrm>
+            <a:prstGeom prst="rect">
+              <a:avLst/>
+            </a:prstGeom>
+          </p:spPr>
+        </p:pic>
+        <p:pic>
+          <p:nvPicPr>
+            <p:cNvPr id="42" name="Bild 41"/>
+            <p:cNvPicPr>
+              <a:picLocks noChangeAspect="1"/>
+            </p:cNvPicPr>
+            <p:nvPr/>
+          </p:nvPicPr>
+          <p:blipFill>
+            <a:blip r:embed="rId5">
+              <a:extLst>
+                <a:ext uri="{28A0092B-C50C-407E-A947-70E740481C1C}">
+                  <a14:useLocalDpi xmlns:a14="http://schemas.microsoft.com/office/drawing/2010/main" val="0"/>
+                </a:ext>
+              </a:extLst>
+            </a:blip>
+            <a:stretch>
+              <a:fillRect/>
+            </a:stretch>
+          </p:blipFill>
+          <p:spPr>
+            <a:xfrm rot="16200000">
+              <a:off x="11335724" y="4069218"/>
+              <a:ext cx="369453" cy="369453"/>
+            </a:xfrm>
+            <a:prstGeom prst="rect">
+              <a:avLst/>
+            </a:prstGeom>
+          </p:spPr>
+        </p:pic>
+        <p:pic>
+          <p:nvPicPr>
+            <p:cNvPr id="43" name="Bild 42"/>
+            <p:cNvPicPr>
+              <a:picLocks noChangeAspect="1"/>
+            </p:cNvPicPr>
+            <p:nvPr/>
+          </p:nvPicPr>
+          <p:blipFill>
+            <a:blip r:embed="rId5">
+              <a:extLst>
+                <a:ext uri="{28A0092B-C50C-407E-A947-70E740481C1C}">
+                  <a14:useLocalDpi xmlns:a14="http://schemas.microsoft.com/office/drawing/2010/main" val="0"/>
+                </a:ext>
+              </a:extLst>
+            </a:blip>
+            <a:stretch>
+              <a:fillRect/>
+            </a:stretch>
+          </p:blipFill>
+          <p:spPr>
+            <a:xfrm rot="16200000">
+              <a:off x="11335724" y="3557284"/>
+              <a:ext cx="369453" cy="369453"/>
+            </a:xfrm>
+            <a:prstGeom prst="rect">
+              <a:avLst/>
+            </a:prstGeom>
+          </p:spPr>
+        </p:pic>
+        <p:pic>
+          <p:nvPicPr>
+            <p:cNvPr id="44" name="Bild 43"/>
+            <p:cNvPicPr>
+              <a:picLocks noChangeAspect="1"/>
+            </p:cNvPicPr>
+            <p:nvPr/>
+          </p:nvPicPr>
+          <p:blipFill>
+            <a:blip r:embed="rId5">
+              <a:alphaModFix amt="50000"/>
+              <a:extLst>
+                <a:ext uri="{28A0092B-C50C-407E-A947-70E740481C1C}">
+                  <a14:useLocalDpi xmlns:a14="http://schemas.microsoft.com/office/drawing/2010/main" val="0"/>
+                </a:ext>
+              </a:extLst>
+            </a:blip>
+            <a:stretch>
+              <a:fillRect/>
+            </a:stretch>
+          </p:blipFill>
+          <p:spPr>
+            <a:xfrm rot="16200000">
+              <a:off x="11335722" y="3045350"/>
+              <a:ext cx="369453" cy="369453"/>
+            </a:xfrm>
+            <a:prstGeom prst="rect">
+              <a:avLst/>
+            </a:prstGeom>
+          </p:spPr>
+        </p:pic>
+        <p:pic>
+          <p:nvPicPr>
+            <p:cNvPr id="45" name="Bild 44"/>
+            <p:cNvPicPr>
+              <a:picLocks noChangeAspect="1"/>
+            </p:cNvPicPr>
+            <p:nvPr/>
+          </p:nvPicPr>
+          <p:blipFill>
+            <a:blip r:embed="rId5">
+              <a:alphaModFix amt="20000"/>
+              <a:extLst>
+                <a:ext uri="{28A0092B-C50C-407E-A947-70E740481C1C}">
+                  <a14:useLocalDpi xmlns:a14="http://schemas.microsoft.com/office/drawing/2010/main" val="0"/>
+                </a:ext>
+              </a:extLst>
+            </a:blip>
+            <a:stretch>
+              <a:fillRect/>
+            </a:stretch>
+          </p:blipFill>
+          <p:spPr>
+            <a:xfrm rot="16200000">
+              <a:off x="11335722" y="2533416"/>
+              <a:ext cx="369453" cy="369453"/>
+            </a:xfrm>
+            <a:prstGeom prst="rect">
+              <a:avLst/>
+            </a:prstGeom>
+          </p:spPr>
+        </p:pic>
+      </p:grpSp>
+      <p:pic>
+        <p:nvPicPr>
+          <p:cNvPr id="47" name="Bild 46"/>
+          <p:cNvPicPr>
+            <a:picLocks noChangeAspect="1"/>
+          </p:cNvPicPr>
+          <p:nvPr/>
+        </p:nvPicPr>
+        <p:blipFill>
+          <a:blip r:embed="rId5">
+            <a:extLst>
+              <a:ext uri="{28A0092B-C50C-407E-A947-70E740481C1C}">
+                <a14:useLocalDpi xmlns:a14="http://schemas.microsoft.com/office/drawing/2010/main" val="0"/>
+              </a:ext>
+            </a:extLst>
+          </a:blip>
+          <a:stretch>
+            <a:fillRect/>
+          </a:stretch>
+        </p:blipFill>
+        <p:spPr>
+          <a:xfrm rot="16200000">
+            <a:off x="11393056" y="5091697"/>
+            <a:ext cx="369453" cy="369453"/>
+          </a:xfrm>
+          <a:prstGeom prst="rect">
+            <a:avLst/>
+          </a:prstGeom>
+        </p:spPr>
+      </p:pic>
     </p:spTree>
     <p:extLst>
       <p:ext uri="{BB962C8B-B14F-4D97-AF65-F5344CB8AC3E}">
-        <p14:creationId xmlns:p14="http://schemas.microsoft.com/office/powerpoint/2010/main" val="1565897196"/>
+        <p14:creationId xmlns:p14="http://schemas.microsoft.com/office/powerpoint/2010/main" val="818966788"/>
       </p:ext>
     </p:extLst>
   </p:cSld>
@@ -3655,7 +4448,7 @@
           <a:lstStyle/>
           <a:p>
             <a:pPr algn="ctr"/>
-            <a:endParaRPr lang="de-DE"/>
+            <a:endParaRPr lang="en-US" dirty="0"/>
           </a:p>
         </p:txBody>
       </p:sp>
@@ -3683,7 +4476,7 @@
           <a:p>
             <a:pPr algn="ctr"/>
             <a:r>
-              <a:rPr lang="de-DE" sz="3600" smtClean="0">
+              <a:rPr lang="en-US" sz="3600" dirty="0" smtClean="0">
                 <a:solidFill>
                   <a:schemeClr val="bg1"/>
                 </a:solidFill>
@@ -3691,8 +4484,16 @@
                 <a:ea typeface="Corbel" charset="0"/>
                 <a:cs typeface="Corbel" charset="0"/>
               </a:rPr>
-              <a:t>Atemsensor</a:t>
-            </a:r>
+              <a:t>Physical Computing</a:t>
+            </a:r>
+            <a:endParaRPr lang="en-US" sz="3600" dirty="0" smtClean="0">
+              <a:solidFill>
+                <a:schemeClr val="bg1"/>
+              </a:solidFill>
+              <a:latin typeface="Corbel" charset="0"/>
+              <a:ea typeface="Corbel" charset="0"/>
+              <a:cs typeface="Corbel" charset="0"/>
+            </a:endParaRPr>
           </a:p>
         </p:txBody>
       </p:sp>
@@ -3756,16 +4557,731 @@
           </a:prstGeom>
         </p:spPr>
       </p:pic>
+      <p:pic>
+        <p:nvPicPr>
+          <p:cNvPr id="5" name="Bild 4"/>
+          <p:cNvPicPr>
+            <a:picLocks noChangeAspect="1"/>
+          </p:cNvPicPr>
+          <p:nvPr/>
+        </p:nvPicPr>
+        <p:blipFill>
+          <a:blip r:embed="rId3">
+            <a:extLst>
+              <a:ext uri="{28A0092B-C50C-407E-A947-70E740481C1C}">
+                <a14:useLocalDpi xmlns:a14="http://schemas.microsoft.com/office/drawing/2010/main" val="0"/>
+              </a:ext>
+            </a:extLst>
+          </a:blip>
+          <a:stretch>
+            <a:fillRect/>
+          </a:stretch>
+        </p:blipFill>
+        <p:spPr>
+          <a:xfrm>
+            <a:off x="1349874" y="2337038"/>
+            <a:ext cx="3696523" cy="2981823"/>
+          </a:xfrm>
+          <a:prstGeom prst="rect">
+            <a:avLst/>
+          </a:prstGeom>
+        </p:spPr>
+      </p:pic>
+      <p:pic>
+        <p:nvPicPr>
+          <p:cNvPr id="6" name="Bild 5"/>
+          <p:cNvPicPr>
+            <a:picLocks noChangeAspect="1"/>
+          </p:cNvPicPr>
+          <p:nvPr/>
+        </p:nvPicPr>
+        <p:blipFill>
+          <a:blip r:embed="rId4">
+            <a:extLst>
+              <a:ext uri="{28A0092B-C50C-407E-A947-70E740481C1C}">
+                <a14:useLocalDpi xmlns:a14="http://schemas.microsoft.com/office/drawing/2010/main" val="0"/>
+              </a:ext>
+            </a:extLst>
+          </a:blip>
+          <a:stretch>
+            <a:fillRect/>
+          </a:stretch>
+        </p:blipFill>
+        <p:spPr>
+          <a:xfrm>
+            <a:off x="6871855" y="1816703"/>
+            <a:ext cx="5223163" cy="4022495"/>
+          </a:xfrm>
+          <a:prstGeom prst="rect">
+            <a:avLst/>
+          </a:prstGeom>
+        </p:spPr>
+      </p:pic>
+      <p:pic>
+        <p:nvPicPr>
+          <p:cNvPr id="10" name="Bild 9"/>
+          <p:cNvPicPr>
+            <a:picLocks noChangeAspect="1"/>
+          </p:cNvPicPr>
+          <p:nvPr/>
+        </p:nvPicPr>
+        <p:blipFill>
+          <a:blip r:embed="rId5">
+            <a:extLst>
+              <a:ext uri="{28A0092B-C50C-407E-A947-70E740481C1C}">
+                <a14:useLocalDpi xmlns:a14="http://schemas.microsoft.com/office/drawing/2010/main" val="0"/>
+              </a:ext>
+            </a:extLst>
+          </a:blip>
+          <a:stretch>
+            <a:fillRect/>
+          </a:stretch>
+        </p:blipFill>
+        <p:spPr>
+          <a:xfrm>
+            <a:off x="6317970" y="5841380"/>
+            <a:ext cx="5777048" cy="909708"/>
+          </a:xfrm>
+          <a:prstGeom prst="rect">
+            <a:avLst/>
+          </a:prstGeom>
+        </p:spPr>
+      </p:pic>
+      <p:sp>
+        <p:nvSpPr>
+          <p:cNvPr id="12" name="Rechteck 11"/>
+          <p:cNvSpPr/>
+          <p:nvPr/>
+        </p:nvSpPr>
+        <p:spPr>
+          <a:xfrm>
+            <a:off x="111136" y="5841380"/>
+            <a:ext cx="6174000" cy="909708"/>
+          </a:xfrm>
+          <a:prstGeom prst="rect">
+            <a:avLst/>
+          </a:prstGeom>
+          <a:solidFill>
+            <a:srgbClr val="2894D9"/>
+          </a:solidFill>
+          <a:ln>
+            <a:noFill/>
+          </a:ln>
+        </p:spPr>
+        <p:style>
+          <a:lnRef idx="2">
+            <a:schemeClr val="accent1">
+              <a:shade val="50000"/>
+            </a:schemeClr>
+          </a:lnRef>
+          <a:fillRef idx="1">
+            <a:schemeClr val="accent1"/>
+          </a:fillRef>
+          <a:effectRef idx="0">
+            <a:schemeClr val="accent1"/>
+          </a:effectRef>
+          <a:fontRef idx="minor">
+            <a:schemeClr val="lt1"/>
+          </a:fontRef>
+        </p:style>
+        <p:txBody>
+          <a:bodyPr rtlCol="0" anchor="ctr"/>
+          <a:lstStyle/>
+          <a:p>
+            <a:pPr algn="ctr"/>
+            <a:endParaRPr lang="de-DE"/>
+          </a:p>
+        </p:txBody>
+      </p:sp>
+      <p:sp>
+        <p:nvSpPr>
+          <p:cNvPr id="2" name="Textfeld 1"/>
+          <p:cNvSpPr txBox="1"/>
+          <p:nvPr/>
+        </p:nvSpPr>
+        <p:spPr>
+          <a:xfrm>
+            <a:off x="640390" y="6111568"/>
+            <a:ext cx="5123582" cy="369332"/>
+          </a:xfrm>
+          <a:prstGeom prst="rect">
+            <a:avLst/>
+          </a:prstGeom>
+          <a:noFill/>
+        </p:spPr>
+        <p:txBody>
+          <a:bodyPr wrap="none" rtlCol="0">
+            <a:spAutoFit/>
+          </a:bodyPr>
+          <a:lstStyle/>
+          <a:p>
+            <a:r>
+              <a:rPr lang="en-US" b="1" dirty="0" smtClean="0">
+                <a:solidFill>
+                  <a:schemeClr val="bg1"/>
+                </a:solidFill>
+                <a:latin typeface="Corbel" charset="0"/>
+                <a:ea typeface="Corbel" charset="0"/>
+                <a:cs typeface="Corbel" charset="0"/>
+              </a:rPr>
+              <a:t>Integrating Stretch Sensor into Penguin Plush Toy</a:t>
+            </a:r>
+            <a:endParaRPr lang="en-US" b="1" dirty="0">
+              <a:solidFill>
+                <a:schemeClr val="bg1"/>
+              </a:solidFill>
+              <a:latin typeface="Corbel" charset="0"/>
+              <a:ea typeface="Corbel" charset="0"/>
+              <a:cs typeface="Corbel" charset="0"/>
+            </a:endParaRPr>
+          </a:p>
+        </p:txBody>
+      </p:sp>
     </p:spTree>
     <p:extLst>
       <p:ext uri="{BB962C8B-B14F-4D97-AF65-F5344CB8AC3E}">
-        <p14:creationId xmlns:p14="http://schemas.microsoft.com/office/powerpoint/2010/main" val="434482388"/>
+        <p14:creationId xmlns:p14="http://schemas.microsoft.com/office/powerpoint/2010/main" val="319883559"/>
       </p:ext>
     </p:extLst>
   </p:cSld>
   <p:clrMapOvr>
     <a:masterClrMapping/>
   </p:clrMapOvr>
+  <p:timing>
+    <p:tnLst>
+      <p:par>
+        <p:cTn id="1" dur="indefinite" restart="never" nodeType="tmRoot"/>
+      </p:par>
+    </p:tnLst>
+  </p:timing>
+</p:sld>
+</file>
+
+<file path=ppt/slides/slide4.xml><?xml version="1.0" encoding="utf-8"?>
+<p:sld xmlns:a="http://schemas.openxmlformats.org/drawingml/2006/main" xmlns:r="http://schemas.openxmlformats.org/officeDocument/2006/relationships" xmlns:p="http://schemas.openxmlformats.org/presentationml/2006/main">
+  <p:cSld>
+    <p:spTree>
+      <p:nvGrpSpPr>
+        <p:cNvPr id="1" name=""/>
+        <p:cNvGrpSpPr/>
+        <p:nvPr/>
+      </p:nvGrpSpPr>
+      <p:grpSpPr>
+        <a:xfrm>
+          <a:off x="0" y="0"/>
+          <a:ext cx="0" cy="0"/>
+          <a:chOff x="0" y="0"/>
+          <a:chExt cx="0" cy="0"/>
+        </a:xfrm>
+      </p:grpSpPr>
+      <p:sp>
+        <p:nvSpPr>
+          <p:cNvPr id="4" name="Rechteck 3"/>
+          <p:cNvSpPr/>
+          <p:nvPr/>
+        </p:nvSpPr>
+        <p:spPr>
+          <a:xfrm>
+            <a:off x="2441007" y="97443"/>
+            <a:ext cx="6534000" cy="1149464"/>
+          </a:xfrm>
+          <a:prstGeom prst="rect">
+            <a:avLst/>
+          </a:prstGeom>
+          <a:solidFill>
+            <a:srgbClr val="5B7CB6"/>
+          </a:solidFill>
+          <a:ln>
+            <a:noFill/>
+          </a:ln>
+        </p:spPr>
+        <p:style>
+          <a:lnRef idx="2">
+            <a:schemeClr val="accent1">
+              <a:shade val="50000"/>
+            </a:schemeClr>
+          </a:lnRef>
+          <a:fillRef idx="1">
+            <a:schemeClr val="accent1"/>
+          </a:fillRef>
+          <a:effectRef idx="0">
+            <a:schemeClr val="accent1"/>
+          </a:effectRef>
+          <a:fontRef idx="minor">
+            <a:schemeClr val="lt1"/>
+          </a:fontRef>
+        </p:style>
+        <p:txBody>
+          <a:bodyPr rtlCol="0" anchor="ctr"/>
+          <a:lstStyle/>
+          <a:p>
+            <a:pPr algn="ctr"/>
+            <a:endParaRPr lang="en-US" dirty="0"/>
+          </a:p>
+        </p:txBody>
+      </p:sp>
+      <p:sp>
+        <p:nvSpPr>
+          <p:cNvPr id="7" name="Textfeld 6"/>
+          <p:cNvSpPr txBox="1"/>
+          <p:nvPr/>
+        </p:nvSpPr>
+        <p:spPr>
+          <a:xfrm>
+            <a:off x="2701636" y="349009"/>
+            <a:ext cx="6040582" cy="646331"/>
+          </a:xfrm>
+          <a:prstGeom prst="rect">
+            <a:avLst/>
+          </a:prstGeom>
+          <a:noFill/>
+        </p:spPr>
+        <p:txBody>
+          <a:bodyPr wrap="square" rtlCol="0">
+            <a:spAutoFit/>
+          </a:bodyPr>
+          <a:lstStyle/>
+          <a:p>
+            <a:pPr algn="ctr"/>
+            <a:r>
+              <a:rPr lang="en-US" sz="3600" dirty="0" smtClean="0">
+                <a:solidFill>
+                  <a:schemeClr val="bg1"/>
+                </a:solidFill>
+                <a:latin typeface="Corbel" charset="0"/>
+                <a:ea typeface="Corbel" charset="0"/>
+                <a:cs typeface="Corbel" charset="0"/>
+              </a:rPr>
+              <a:t>Reinforcement Learning</a:t>
+            </a:r>
+            <a:endParaRPr lang="en-US" sz="3600" dirty="0" smtClean="0">
+              <a:solidFill>
+                <a:schemeClr val="bg1"/>
+              </a:solidFill>
+              <a:latin typeface="Corbel" charset="0"/>
+              <a:ea typeface="Corbel" charset="0"/>
+              <a:cs typeface="Corbel" charset="0"/>
+            </a:endParaRPr>
+          </a:p>
+        </p:txBody>
+      </p:sp>
+      <p:pic>
+        <p:nvPicPr>
+          <p:cNvPr id="8" name="Bild 7"/>
+          <p:cNvPicPr>
+            <a:picLocks noChangeAspect="1"/>
+          </p:cNvPicPr>
+          <p:nvPr/>
+        </p:nvPicPr>
+        <p:blipFill>
+          <a:blip r:embed="rId2">
+            <a:extLst>
+              <a:ext uri="{28A0092B-C50C-407E-A947-70E740481C1C}">
+                <a14:useLocalDpi xmlns:a14="http://schemas.microsoft.com/office/drawing/2010/main" val="0"/>
+              </a:ext>
+            </a:extLst>
+          </a:blip>
+          <a:stretch>
+            <a:fillRect/>
+          </a:stretch>
+        </p:blipFill>
+        <p:spPr>
+          <a:xfrm>
+            <a:off x="111136" y="97448"/>
+            <a:ext cx="2299129" cy="1149459"/>
+          </a:xfrm>
+          <a:prstGeom prst="rect">
+            <a:avLst/>
+          </a:prstGeom>
+        </p:spPr>
+      </p:pic>
+      <p:pic>
+        <p:nvPicPr>
+          <p:cNvPr id="9" name="Bild 8"/>
+          <p:cNvPicPr>
+            <a:picLocks noChangeAspect="1"/>
+          </p:cNvPicPr>
+          <p:nvPr/>
+        </p:nvPicPr>
+        <p:blipFill>
+          <a:blip r:embed="rId2">
+            <a:extLst>
+              <a:ext uri="{28A0092B-C50C-407E-A947-70E740481C1C}">
+                <a14:useLocalDpi xmlns:a14="http://schemas.microsoft.com/office/drawing/2010/main" val="0"/>
+              </a:ext>
+            </a:extLst>
+          </a:blip>
+          <a:stretch>
+            <a:fillRect/>
+          </a:stretch>
+        </p:blipFill>
+        <p:spPr>
+          <a:xfrm>
+            <a:off x="9002847" y="97444"/>
+            <a:ext cx="3092171" cy="1149464"/>
+          </a:xfrm>
+          <a:prstGeom prst="rect">
+            <a:avLst/>
+          </a:prstGeom>
+        </p:spPr>
+      </p:pic>
+      <p:pic>
+        <p:nvPicPr>
+          <p:cNvPr id="10" name="Bild 9"/>
+          <p:cNvPicPr>
+            <a:picLocks noChangeAspect="1"/>
+          </p:cNvPicPr>
+          <p:nvPr/>
+        </p:nvPicPr>
+        <p:blipFill>
+          <a:blip r:embed="rId3">
+            <a:extLst>
+              <a:ext uri="{28A0092B-C50C-407E-A947-70E740481C1C}">
+                <a14:useLocalDpi xmlns:a14="http://schemas.microsoft.com/office/drawing/2010/main" val="0"/>
+              </a:ext>
+            </a:extLst>
+          </a:blip>
+          <a:stretch>
+            <a:fillRect/>
+          </a:stretch>
+        </p:blipFill>
+        <p:spPr>
+          <a:xfrm>
+            <a:off x="6317970" y="5841380"/>
+            <a:ext cx="5777048" cy="909708"/>
+          </a:xfrm>
+          <a:prstGeom prst="rect">
+            <a:avLst/>
+          </a:prstGeom>
+        </p:spPr>
+      </p:pic>
+      <p:sp>
+        <p:nvSpPr>
+          <p:cNvPr id="12" name="Rechteck 11"/>
+          <p:cNvSpPr/>
+          <p:nvPr/>
+        </p:nvSpPr>
+        <p:spPr>
+          <a:xfrm>
+            <a:off x="111136" y="5841380"/>
+            <a:ext cx="6174000" cy="909708"/>
+          </a:xfrm>
+          <a:prstGeom prst="rect">
+            <a:avLst/>
+          </a:prstGeom>
+          <a:solidFill>
+            <a:srgbClr val="2894D9"/>
+          </a:solidFill>
+          <a:ln>
+            <a:noFill/>
+          </a:ln>
+        </p:spPr>
+        <p:style>
+          <a:lnRef idx="2">
+            <a:schemeClr val="accent1">
+              <a:shade val="50000"/>
+            </a:schemeClr>
+          </a:lnRef>
+          <a:fillRef idx="1">
+            <a:schemeClr val="accent1"/>
+          </a:fillRef>
+          <a:effectRef idx="0">
+            <a:schemeClr val="accent1"/>
+          </a:effectRef>
+          <a:fontRef idx="minor">
+            <a:schemeClr val="lt1"/>
+          </a:fontRef>
+        </p:style>
+        <p:txBody>
+          <a:bodyPr rtlCol="0" anchor="ctr"/>
+          <a:lstStyle/>
+          <a:p>
+            <a:pPr algn="ctr"/>
+            <a:endParaRPr lang="de-DE"/>
+          </a:p>
+        </p:txBody>
+      </p:sp>
+    </p:spTree>
+    <p:extLst>
+      <p:ext uri="{BB962C8B-B14F-4D97-AF65-F5344CB8AC3E}">
+        <p14:creationId xmlns:p14="http://schemas.microsoft.com/office/powerpoint/2010/main" val="63530359"/>
+      </p:ext>
+    </p:extLst>
+  </p:cSld>
+  <p:clrMapOvr>
+    <a:masterClrMapping/>
+  </p:clrMapOvr>
+  <p:timing>
+    <p:tnLst>
+      <p:par>
+        <p:cTn id="1" dur="indefinite" restart="never" nodeType="tmRoot"/>
+      </p:par>
+    </p:tnLst>
+  </p:timing>
+</p:sld>
+</file>
+
+<file path=ppt/slides/slide5.xml><?xml version="1.0" encoding="utf-8"?>
+<p:sld xmlns:a="http://schemas.openxmlformats.org/drawingml/2006/main" xmlns:r="http://schemas.openxmlformats.org/officeDocument/2006/relationships" xmlns:p="http://schemas.openxmlformats.org/presentationml/2006/main">
+  <p:cSld>
+    <p:spTree>
+      <p:nvGrpSpPr>
+        <p:cNvPr id="1" name=""/>
+        <p:cNvGrpSpPr/>
+        <p:nvPr/>
+      </p:nvGrpSpPr>
+      <p:grpSpPr>
+        <a:xfrm>
+          <a:off x="0" y="0"/>
+          <a:ext cx="0" cy="0"/>
+          <a:chOff x="0" y="0"/>
+          <a:chExt cx="0" cy="0"/>
+        </a:xfrm>
+      </p:grpSpPr>
+      <p:sp>
+        <p:nvSpPr>
+          <p:cNvPr id="4" name="Rechteck 3"/>
+          <p:cNvSpPr/>
+          <p:nvPr/>
+        </p:nvSpPr>
+        <p:spPr>
+          <a:xfrm>
+            <a:off x="2441007" y="97443"/>
+            <a:ext cx="6534000" cy="1149464"/>
+          </a:xfrm>
+          <a:prstGeom prst="rect">
+            <a:avLst/>
+          </a:prstGeom>
+          <a:solidFill>
+            <a:srgbClr val="5B7CB6"/>
+          </a:solidFill>
+          <a:ln>
+            <a:noFill/>
+          </a:ln>
+        </p:spPr>
+        <p:style>
+          <a:lnRef idx="2">
+            <a:schemeClr val="accent1">
+              <a:shade val="50000"/>
+            </a:schemeClr>
+          </a:lnRef>
+          <a:fillRef idx="1">
+            <a:schemeClr val="accent1"/>
+          </a:fillRef>
+          <a:effectRef idx="0">
+            <a:schemeClr val="accent1"/>
+          </a:effectRef>
+          <a:fontRef idx="minor">
+            <a:schemeClr val="lt1"/>
+          </a:fontRef>
+        </p:style>
+        <p:txBody>
+          <a:bodyPr rtlCol="0" anchor="ctr"/>
+          <a:lstStyle/>
+          <a:p>
+            <a:pPr algn="ctr"/>
+            <a:endParaRPr lang="en-US" dirty="0"/>
+          </a:p>
+        </p:txBody>
+      </p:sp>
+      <p:sp>
+        <p:nvSpPr>
+          <p:cNvPr id="7" name="Textfeld 6"/>
+          <p:cNvSpPr txBox="1"/>
+          <p:nvPr/>
+        </p:nvSpPr>
+        <p:spPr>
+          <a:xfrm>
+            <a:off x="2701636" y="349009"/>
+            <a:ext cx="6040582" cy="646331"/>
+          </a:xfrm>
+          <a:prstGeom prst="rect">
+            <a:avLst/>
+          </a:prstGeom>
+          <a:noFill/>
+        </p:spPr>
+        <p:txBody>
+          <a:bodyPr wrap="square" rtlCol="0">
+            <a:spAutoFit/>
+          </a:bodyPr>
+          <a:lstStyle/>
+          <a:p>
+            <a:pPr algn="ctr"/>
+            <a:r>
+              <a:rPr lang="en-US" sz="3600" dirty="0" smtClean="0">
+                <a:solidFill>
+                  <a:schemeClr val="bg1"/>
+                </a:solidFill>
+                <a:latin typeface="Corbel" charset="0"/>
+                <a:ea typeface="Corbel" charset="0"/>
+                <a:cs typeface="Corbel" charset="0"/>
+              </a:rPr>
+              <a:t>Bio Signals</a:t>
+            </a:r>
+            <a:endParaRPr lang="en-US" sz="3600" dirty="0" smtClean="0">
+              <a:solidFill>
+                <a:schemeClr val="bg1"/>
+              </a:solidFill>
+              <a:latin typeface="Corbel" charset="0"/>
+              <a:ea typeface="Corbel" charset="0"/>
+              <a:cs typeface="Corbel" charset="0"/>
+            </a:endParaRPr>
+          </a:p>
+        </p:txBody>
+      </p:sp>
+      <p:pic>
+        <p:nvPicPr>
+          <p:cNvPr id="8" name="Bild 7"/>
+          <p:cNvPicPr>
+            <a:picLocks noChangeAspect="1"/>
+          </p:cNvPicPr>
+          <p:nvPr/>
+        </p:nvPicPr>
+        <p:blipFill>
+          <a:blip r:embed="rId2">
+            <a:extLst>
+              <a:ext uri="{28A0092B-C50C-407E-A947-70E740481C1C}">
+                <a14:useLocalDpi xmlns:a14="http://schemas.microsoft.com/office/drawing/2010/main" val="0"/>
+              </a:ext>
+            </a:extLst>
+          </a:blip>
+          <a:stretch>
+            <a:fillRect/>
+          </a:stretch>
+        </p:blipFill>
+        <p:spPr>
+          <a:xfrm>
+            <a:off x="111136" y="97448"/>
+            <a:ext cx="2299129" cy="1149459"/>
+          </a:xfrm>
+          <a:prstGeom prst="rect">
+            <a:avLst/>
+          </a:prstGeom>
+        </p:spPr>
+      </p:pic>
+      <p:pic>
+        <p:nvPicPr>
+          <p:cNvPr id="9" name="Bild 8"/>
+          <p:cNvPicPr>
+            <a:picLocks noChangeAspect="1"/>
+          </p:cNvPicPr>
+          <p:nvPr/>
+        </p:nvPicPr>
+        <p:blipFill>
+          <a:blip r:embed="rId2">
+            <a:extLst>
+              <a:ext uri="{28A0092B-C50C-407E-A947-70E740481C1C}">
+                <a14:useLocalDpi xmlns:a14="http://schemas.microsoft.com/office/drawing/2010/main" val="0"/>
+              </a:ext>
+            </a:extLst>
+          </a:blip>
+          <a:stretch>
+            <a:fillRect/>
+          </a:stretch>
+        </p:blipFill>
+        <p:spPr>
+          <a:xfrm>
+            <a:off x="9002847" y="97444"/>
+            <a:ext cx="3092171" cy="1149464"/>
+          </a:xfrm>
+          <a:prstGeom prst="rect">
+            <a:avLst/>
+          </a:prstGeom>
+        </p:spPr>
+      </p:pic>
+      <p:pic>
+        <p:nvPicPr>
+          <p:cNvPr id="10" name="Bild 9"/>
+          <p:cNvPicPr>
+            <a:picLocks noChangeAspect="1"/>
+          </p:cNvPicPr>
+          <p:nvPr/>
+        </p:nvPicPr>
+        <p:blipFill>
+          <a:blip r:embed="rId3">
+            <a:extLst>
+              <a:ext uri="{28A0092B-C50C-407E-A947-70E740481C1C}">
+                <a14:useLocalDpi xmlns:a14="http://schemas.microsoft.com/office/drawing/2010/main" val="0"/>
+              </a:ext>
+            </a:extLst>
+          </a:blip>
+          <a:stretch>
+            <a:fillRect/>
+          </a:stretch>
+        </p:blipFill>
+        <p:spPr>
+          <a:xfrm>
+            <a:off x="6317970" y="5841380"/>
+            <a:ext cx="5777048" cy="909708"/>
+          </a:xfrm>
+          <a:prstGeom prst="rect">
+            <a:avLst/>
+          </a:prstGeom>
+        </p:spPr>
+      </p:pic>
+      <p:sp>
+        <p:nvSpPr>
+          <p:cNvPr id="12" name="Rechteck 11"/>
+          <p:cNvSpPr/>
+          <p:nvPr/>
+        </p:nvSpPr>
+        <p:spPr>
+          <a:xfrm>
+            <a:off x="111136" y="5841380"/>
+            <a:ext cx="6174000" cy="909708"/>
+          </a:xfrm>
+          <a:prstGeom prst="rect">
+            <a:avLst/>
+          </a:prstGeom>
+          <a:solidFill>
+            <a:srgbClr val="2894D9"/>
+          </a:solidFill>
+          <a:ln>
+            <a:noFill/>
+          </a:ln>
+        </p:spPr>
+        <p:style>
+          <a:lnRef idx="2">
+            <a:schemeClr val="accent1">
+              <a:shade val="50000"/>
+            </a:schemeClr>
+          </a:lnRef>
+          <a:fillRef idx="1">
+            <a:schemeClr val="accent1"/>
+          </a:fillRef>
+          <a:effectRef idx="0">
+            <a:schemeClr val="accent1"/>
+          </a:effectRef>
+          <a:fontRef idx="minor">
+            <a:schemeClr val="lt1"/>
+          </a:fontRef>
+        </p:style>
+        <p:txBody>
+          <a:bodyPr rtlCol="0" anchor="ctr"/>
+          <a:lstStyle/>
+          <a:p>
+            <a:pPr algn="ctr"/>
+            <a:endParaRPr lang="en-US" dirty="0"/>
+          </a:p>
+        </p:txBody>
+      </p:sp>
+    </p:spTree>
+    <p:extLst>
+      <p:ext uri="{BB962C8B-B14F-4D97-AF65-F5344CB8AC3E}">
+        <p14:creationId xmlns:p14="http://schemas.microsoft.com/office/powerpoint/2010/main" val="1152019837"/>
+      </p:ext>
+    </p:extLst>
+  </p:cSld>
+  <p:clrMapOvr>
+    <a:masterClrMapping/>
+  </p:clrMapOvr>
+  <p:timing>
+    <p:tnLst>
+      <p:par>
+        <p:cTn id="1" dur="indefinite" restart="never" nodeType="tmRoot"/>
+      </p:par>
+    </p:tnLst>
+  </p:timing>
 </p:sld>
 </file>
 

</xml_diff>

<commit_message>
added presentation of software stack
</commit_message>
<xml_diff>
--- a/presentation/Abschlusspräsentation.pptx
+++ b/presentation/Abschlusspräsentation.pptx
@@ -9,8 +9,9 @@
     <p:sldId id="264" r:id="rId3"/>
     <p:sldId id="259" r:id="rId4"/>
     <p:sldId id="265" r:id="rId5"/>
-    <p:sldId id="263" r:id="rId6"/>
-    <p:sldId id="266" r:id="rId7"/>
+    <p:sldId id="267" r:id="rId6"/>
+    <p:sldId id="263" r:id="rId7"/>
+    <p:sldId id="266" r:id="rId8"/>
   </p:sldIdLst>
   <p:sldSz cx="12192000" cy="6858000"/>
   <p:notesSz cx="6858000" cy="9144000"/>
@@ -159,10 +160,9 @@
           </a:lstStyle>
           <a:p>
             <a:r>
-              <a:rPr lang="de-DE" smtClean="0"/>
+              <a:rPr lang="de-DE"/>
               <a:t>Mastertitelformat bearbeiten</a:t>
             </a:r>
-            <a:endParaRPr lang="de-DE"/>
           </a:p>
         </p:txBody>
       </p:sp>
@@ -224,10 +224,9 @@
           </a:lstStyle>
           <a:p>
             <a:r>
-              <a:rPr lang="de-DE" smtClean="0"/>
+              <a:rPr lang="de-DE"/>
               <a:t>Master-Untertitelformat bearbeiten</a:t>
             </a:r>
-            <a:endParaRPr lang="de-DE"/>
           </a:p>
         </p:txBody>
       </p:sp>
@@ -248,7 +247,7 @@
           <a:p>
             <a:fld id="{94CE6F9C-8138-ED4D-AC4A-D3C3EB29335E}" type="datetimeFigureOut">
               <a:rPr lang="de-DE" smtClean="0"/>
-              <a:t>11.07.16</a:t>
+              <a:t>13.07.2016</a:t>
             </a:fld>
             <a:endParaRPr lang="de-DE"/>
           </a:p>
@@ -290,7 +289,7 @@
           <a:p>
             <a:fld id="{B088749B-5F51-9A42-930D-44F09B8F89B2}" type="slidenum">
               <a:rPr lang="de-DE" smtClean="0"/>
-              <a:t>‹Nr.›</a:t>
+              <a:t>‹#›</a:t>
             </a:fld>
             <a:endParaRPr lang="de-DE"/>
           </a:p>
@@ -342,10 +341,9 @@
           <a:lstStyle/>
           <a:p>
             <a:r>
-              <a:rPr lang="de-DE" smtClean="0"/>
+              <a:rPr lang="de-DE"/>
               <a:t>Mastertitelformat bearbeiten</a:t>
             </a:r>
-            <a:endParaRPr lang="de-DE"/>
           </a:p>
         </p:txBody>
       </p:sp>
@@ -366,38 +364,37 @@
           <a:p>
             <a:pPr lvl="0"/>
             <a:r>
-              <a:rPr lang="de-DE" smtClean="0"/>
+              <a:rPr lang="de-DE"/>
               <a:t>Mastertextformat bearbeiten</a:t>
             </a:r>
           </a:p>
           <a:p>
             <a:pPr lvl="1"/>
             <a:r>
-              <a:rPr lang="de-DE" smtClean="0"/>
+              <a:rPr lang="de-DE"/>
               <a:t>Zweite Ebene</a:t>
             </a:r>
           </a:p>
           <a:p>
             <a:pPr lvl="2"/>
             <a:r>
-              <a:rPr lang="de-DE" smtClean="0"/>
+              <a:rPr lang="de-DE"/>
               <a:t>Dritte Ebene</a:t>
             </a:r>
           </a:p>
           <a:p>
             <a:pPr lvl="3"/>
             <a:r>
-              <a:rPr lang="de-DE" smtClean="0"/>
+              <a:rPr lang="de-DE"/>
               <a:t>Vierte Ebene</a:t>
             </a:r>
           </a:p>
           <a:p>
             <a:pPr lvl="4"/>
             <a:r>
-              <a:rPr lang="de-DE" smtClean="0"/>
+              <a:rPr lang="de-DE"/>
               <a:t>Fünfte Ebene</a:t>
             </a:r>
-            <a:endParaRPr lang="de-DE"/>
           </a:p>
         </p:txBody>
       </p:sp>
@@ -418,7 +415,7 @@
           <a:p>
             <a:fld id="{94CE6F9C-8138-ED4D-AC4A-D3C3EB29335E}" type="datetimeFigureOut">
               <a:rPr lang="de-DE" smtClean="0"/>
-              <a:t>11.07.16</a:t>
+              <a:t>13.07.2016</a:t>
             </a:fld>
             <a:endParaRPr lang="de-DE"/>
           </a:p>
@@ -460,7 +457,7 @@
           <a:p>
             <a:fld id="{B088749B-5F51-9A42-930D-44F09B8F89B2}" type="slidenum">
               <a:rPr lang="de-DE" smtClean="0"/>
-              <a:t>‹Nr.›</a:t>
+              <a:t>‹#›</a:t>
             </a:fld>
             <a:endParaRPr lang="de-DE"/>
           </a:p>
@@ -517,10 +514,9 @@
           <a:lstStyle/>
           <a:p>
             <a:r>
-              <a:rPr lang="de-DE" smtClean="0"/>
+              <a:rPr lang="de-DE"/>
               <a:t>Mastertitelformat bearbeiten</a:t>
             </a:r>
-            <a:endParaRPr lang="de-DE"/>
           </a:p>
         </p:txBody>
       </p:sp>
@@ -546,38 +542,37 @@
           <a:p>
             <a:pPr lvl="0"/>
             <a:r>
-              <a:rPr lang="de-DE" smtClean="0"/>
+              <a:rPr lang="de-DE"/>
               <a:t>Mastertextformat bearbeiten</a:t>
             </a:r>
           </a:p>
           <a:p>
             <a:pPr lvl="1"/>
             <a:r>
-              <a:rPr lang="de-DE" smtClean="0"/>
+              <a:rPr lang="de-DE"/>
               <a:t>Zweite Ebene</a:t>
             </a:r>
           </a:p>
           <a:p>
             <a:pPr lvl="2"/>
             <a:r>
-              <a:rPr lang="de-DE" smtClean="0"/>
+              <a:rPr lang="de-DE"/>
               <a:t>Dritte Ebene</a:t>
             </a:r>
           </a:p>
           <a:p>
             <a:pPr lvl="3"/>
             <a:r>
-              <a:rPr lang="de-DE" smtClean="0"/>
+              <a:rPr lang="de-DE"/>
               <a:t>Vierte Ebene</a:t>
             </a:r>
           </a:p>
           <a:p>
             <a:pPr lvl="4"/>
             <a:r>
-              <a:rPr lang="de-DE" smtClean="0"/>
+              <a:rPr lang="de-DE"/>
               <a:t>Fünfte Ebene</a:t>
             </a:r>
-            <a:endParaRPr lang="de-DE"/>
           </a:p>
         </p:txBody>
       </p:sp>
@@ -598,7 +593,7 @@
           <a:p>
             <a:fld id="{94CE6F9C-8138-ED4D-AC4A-D3C3EB29335E}" type="datetimeFigureOut">
               <a:rPr lang="de-DE" smtClean="0"/>
-              <a:t>11.07.16</a:t>
+              <a:t>13.07.2016</a:t>
             </a:fld>
             <a:endParaRPr lang="de-DE"/>
           </a:p>
@@ -640,7 +635,7 @@
           <a:p>
             <a:fld id="{B088749B-5F51-9A42-930D-44F09B8F89B2}" type="slidenum">
               <a:rPr lang="de-DE" smtClean="0"/>
-              <a:t>‹Nr.›</a:t>
+              <a:t>‹#›</a:t>
             </a:fld>
             <a:endParaRPr lang="de-DE"/>
           </a:p>
@@ -692,10 +687,9 @@
           <a:lstStyle/>
           <a:p>
             <a:r>
-              <a:rPr lang="de-DE" smtClean="0"/>
+              <a:rPr lang="de-DE"/>
               <a:t>Mastertitelformat bearbeiten</a:t>
             </a:r>
-            <a:endParaRPr lang="de-DE"/>
           </a:p>
         </p:txBody>
       </p:sp>
@@ -716,38 +710,37 @@
           <a:p>
             <a:pPr lvl="0"/>
             <a:r>
-              <a:rPr lang="de-DE" smtClean="0"/>
+              <a:rPr lang="de-DE"/>
               <a:t>Mastertextformat bearbeiten</a:t>
             </a:r>
           </a:p>
           <a:p>
             <a:pPr lvl="1"/>
             <a:r>
-              <a:rPr lang="de-DE" smtClean="0"/>
+              <a:rPr lang="de-DE"/>
               <a:t>Zweite Ebene</a:t>
             </a:r>
           </a:p>
           <a:p>
             <a:pPr lvl="2"/>
             <a:r>
-              <a:rPr lang="de-DE" smtClean="0"/>
+              <a:rPr lang="de-DE"/>
               <a:t>Dritte Ebene</a:t>
             </a:r>
           </a:p>
           <a:p>
             <a:pPr lvl="3"/>
             <a:r>
-              <a:rPr lang="de-DE" smtClean="0"/>
+              <a:rPr lang="de-DE"/>
               <a:t>Vierte Ebene</a:t>
             </a:r>
           </a:p>
           <a:p>
             <a:pPr lvl="4"/>
             <a:r>
-              <a:rPr lang="de-DE" smtClean="0"/>
+              <a:rPr lang="de-DE"/>
               <a:t>Fünfte Ebene</a:t>
             </a:r>
-            <a:endParaRPr lang="de-DE"/>
           </a:p>
         </p:txBody>
       </p:sp>
@@ -768,7 +761,7 @@
           <a:p>
             <a:fld id="{94CE6F9C-8138-ED4D-AC4A-D3C3EB29335E}" type="datetimeFigureOut">
               <a:rPr lang="de-DE" smtClean="0"/>
-              <a:t>11.07.16</a:t>
+              <a:t>13.07.2016</a:t>
             </a:fld>
             <a:endParaRPr lang="de-DE"/>
           </a:p>
@@ -810,7 +803,7 @@
           <a:p>
             <a:fld id="{B088749B-5F51-9A42-930D-44F09B8F89B2}" type="slidenum">
               <a:rPr lang="de-DE" smtClean="0"/>
-              <a:t>‹Nr.›</a:t>
+              <a:t>‹#›</a:t>
             </a:fld>
             <a:endParaRPr lang="de-DE"/>
           </a:p>
@@ -871,10 +864,9 @@
           </a:lstStyle>
           <a:p>
             <a:r>
-              <a:rPr lang="de-DE" smtClean="0"/>
+              <a:rPr lang="de-DE"/>
               <a:t>Mastertitelformat bearbeiten</a:t>
             </a:r>
-            <a:endParaRPr lang="de-DE"/>
           </a:p>
         </p:txBody>
       </p:sp>
@@ -991,7 +983,7 @@
           <a:p>
             <a:pPr lvl="0"/>
             <a:r>
-              <a:rPr lang="de-DE" smtClean="0"/>
+              <a:rPr lang="de-DE"/>
               <a:t>Mastertextformat bearbeiten</a:t>
             </a:r>
           </a:p>
@@ -1014,7 +1006,7 @@
           <a:p>
             <a:fld id="{94CE6F9C-8138-ED4D-AC4A-D3C3EB29335E}" type="datetimeFigureOut">
               <a:rPr lang="de-DE" smtClean="0"/>
-              <a:t>11.07.16</a:t>
+              <a:t>13.07.2016</a:t>
             </a:fld>
             <a:endParaRPr lang="de-DE"/>
           </a:p>
@@ -1056,7 +1048,7 @@
           <a:p>
             <a:fld id="{B088749B-5F51-9A42-930D-44F09B8F89B2}" type="slidenum">
               <a:rPr lang="de-DE" smtClean="0"/>
-              <a:t>‹Nr.›</a:t>
+              <a:t>‹#›</a:t>
             </a:fld>
             <a:endParaRPr lang="de-DE"/>
           </a:p>
@@ -1108,10 +1100,9 @@
           <a:lstStyle/>
           <a:p>
             <a:r>
-              <a:rPr lang="de-DE" smtClean="0"/>
+              <a:rPr lang="de-DE"/>
               <a:t>Mastertitelformat bearbeiten</a:t>
             </a:r>
-            <a:endParaRPr lang="de-DE"/>
           </a:p>
         </p:txBody>
       </p:sp>
@@ -1137,38 +1128,37 @@
           <a:p>
             <a:pPr lvl="0"/>
             <a:r>
-              <a:rPr lang="de-DE" smtClean="0"/>
+              <a:rPr lang="de-DE"/>
               <a:t>Mastertextformat bearbeiten</a:t>
             </a:r>
           </a:p>
           <a:p>
             <a:pPr lvl="1"/>
             <a:r>
-              <a:rPr lang="de-DE" smtClean="0"/>
+              <a:rPr lang="de-DE"/>
               <a:t>Zweite Ebene</a:t>
             </a:r>
           </a:p>
           <a:p>
             <a:pPr lvl="2"/>
             <a:r>
-              <a:rPr lang="de-DE" smtClean="0"/>
+              <a:rPr lang="de-DE"/>
               <a:t>Dritte Ebene</a:t>
             </a:r>
           </a:p>
           <a:p>
             <a:pPr lvl="3"/>
             <a:r>
-              <a:rPr lang="de-DE" smtClean="0"/>
+              <a:rPr lang="de-DE"/>
               <a:t>Vierte Ebene</a:t>
             </a:r>
           </a:p>
           <a:p>
             <a:pPr lvl="4"/>
             <a:r>
-              <a:rPr lang="de-DE" smtClean="0"/>
+              <a:rPr lang="de-DE"/>
               <a:t>Fünfte Ebene</a:t>
             </a:r>
-            <a:endParaRPr lang="de-DE"/>
           </a:p>
         </p:txBody>
       </p:sp>
@@ -1194,38 +1184,37 @@
           <a:p>
             <a:pPr lvl="0"/>
             <a:r>
-              <a:rPr lang="de-DE" smtClean="0"/>
+              <a:rPr lang="de-DE"/>
               <a:t>Mastertextformat bearbeiten</a:t>
             </a:r>
           </a:p>
           <a:p>
             <a:pPr lvl="1"/>
             <a:r>
-              <a:rPr lang="de-DE" smtClean="0"/>
+              <a:rPr lang="de-DE"/>
               <a:t>Zweite Ebene</a:t>
             </a:r>
           </a:p>
           <a:p>
             <a:pPr lvl="2"/>
             <a:r>
-              <a:rPr lang="de-DE" smtClean="0"/>
+              <a:rPr lang="de-DE"/>
               <a:t>Dritte Ebene</a:t>
             </a:r>
           </a:p>
           <a:p>
             <a:pPr lvl="3"/>
             <a:r>
-              <a:rPr lang="de-DE" smtClean="0"/>
+              <a:rPr lang="de-DE"/>
               <a:t>Vierte Ebene</a:t>
             </a:r>
           </a:p>
           <a:p>
             <a:pPr lvl="4"/>
             <a:r>
-              <a:rPr lang="de-DE" smtClean="0"/>
+              <a:rPr lang="de-DE"/>
               <a:t>Fünfte Ebene</a:t>
             </a:r>
-            <a:endParaRPr lang="de-DE"/>
           </a:p>
         </p:txBody>
       </p:sp>
@@ -1246,7 +1235,7 @@
           <a:p>
             <a:fld id="{94CE6F9C-8138-ED4D-AC4A-D3C3EB29335E}" type="datetimeFigureOut">
               <a:rPr lang="de-DE" smtClean="0"/>
-              <a:t>11.07.16</a:t>
+              <a:t>13.07.2016</a:t>
             </a:fld>
             <a:endParaRPr lang="de-DE"/>
           </a:p>
@@ -1288,7 +1277,7 @@
           <a:p>
             <a:fld id="{B088749B-5F51-9A42-930D-44F09B8F89B2}" type="slidenum">
               <a:rPr lang="de-DE" smtClean="0"/>
-              <a:t>‹Nr.›</a:t>
+              <a:t>‹#›</a:t>
             </a:fld>
             <a:endParaRPr lang="de-DE"/>
           </a:p>
@@ -1345,10 +1334,9 @@
           <a:lstStyle/>
           <a:p>
             <a:r>
-              <a:rPr lang="de-DE" smtClean="0"/>
+              <a:rPr lang="de-DE"/>
               <a:t>Mastertitelformat bearbeiten</a:t>
             </a:r>
-            <a:endParaRPr lang="de-DE"/>
           </a:p>
         </p:txBody>
       </p:sp>
@@ -1411,7 +1399,7 @@
           <a:p>
             <a:pPr lvl="0"/>
             <a:r>
-              <a:rPr lang="de-DE" smtClean="0"/>
+              <a:rPr lang="de-DE"/>
               <a:t>Mastertextformat bearbeiten</a:t>
             </a:r>
           </a:p>
@@ -1439,38 +1427,37 @@
           <a:p>
             <a:pPr lvl="0"/>
             <a:r>
-              <a:rPr lang="de-DE" smtClean="0"/>
+              <a:rPr lang="de-DE"/>
               <a:t>Mastertextformat bearbeiten</a:t>
             </a:r>
           </a:p>
           <a:p>
             <a:pPr lvl="1"/>
             <a:r>
-              <a:rPr lang="de-DE" smtClean="0"/>
+              <a:rPr lang="de-DE"/>
               <a:t>Zweite Ebene</a:t>
             </a:r>
           </a:p>
           <a:p>
             <a:pPr lvl="2"/>
             <a:r>
-              <a:rPr lang="de-DE" smtClean="0"/>
+              <a:rPr lang="de-DE"/>
               <a:t>Dritte Ebene</a:t>
             </a:r>
           </a:p>
           <a:p>
             <a:pPr lvl="3"/>
             <a:r>
-              <a:rPr lang="de-DE" smtClean="0"/>
+              <a:rPr lang="de-DE"/>
               <a:t>Vierte Ebene</a:t>
             </a:r>
           </a:p>
           <a:p>
             <a:pPr lvl="4"/>
             <a:r>
-              <a:rPr lang="de-DE" smtClean="0"/>
+              <a:rPr lang="de-DE"/>
               <a:t>Fünfte Ebene</a:t>
             </a:r>
-            <a:endParaRPr lang="de-DE"/>
           </a:p>
         </p:txBody>
       </p:sp>
@@ -1533,7 +1520,7 @@
           <a:p>
             <a:pPr lvl="0"/>
             <a:r>
-              <a:rPr lang="de-DE" smtClean="0"/>
+              <a:rPr lang="de-DE"/>
               <a:t>Mastertextformat bearbeiten</a:t>
             </a:r>
           </a:p>
@@ -1561,38 +1548,37 @@
           <a:p>
             <a:pPr lvl="0"/>
             <a:r>
-              <a:rPr lang="de-DE" smtClean="0"/>
+              <a:rPr lang="de-DE"/>
               <a:t>Mastertextformat bearbeiten</a:t>
             </a:r>
           </a:p>
           <a:p>
             <a:pPr lvl="1"/>
             <a:r>
-              <a:rPr lang="de-DE" smtClean="0"/>
+              <a:rPr lang="de-DE"/>
               <a:t>Zweite Ebene</a:t>
             </a:r>
           </a:p>
           <a:p>
             <a:pPr lvl="2"/>
             <a:r>
-              <a:rPr lang="de-DE" smtClean="0"/>
+              <a:rPr lang="de-DE"/>
               <a:t>Dritte Ebene</a:t>
             </a:r>
           </a:p>
           <a:p>
             <a:pPr lvl="3"/>
             <a:r>
-              <a:rPr lang="de-DE" smtClean="0"/>
+              <a:rPr lang="de-DE"/>
               <a:t>Vierte Ebene</a:t>
             </a:r>
           </a:p>
           <a:p>
             <a:pPr lvl="4"/>
             <a:r>
-              <a:rPr lang="de-DE" smtClean="0"/>
+              <a:rPr lang="de-DE"/>
               <a:t>Fünfte Ebene</a:t>
             </a:r>
-            <a:endParaRPr lang="de-DE"/>
           </a:p>
         </p:txBody>
       </p:sp>
@@ -1613,7 +1599,7 @@
           <a:p>
             <a:fld id="{94CE6F9C-8138-ED4D-AC4A-D3C3EB29335E}" type="datetimeFigureOut">
               <a:rPr lang="de-DE" smtClean="0"/>
-              <a:t>11.07.16</a:t>
+              <a:t>13.07.2016</a:t>
             </a:fld>
             <a:endParaRPr lang="de-DE"/>
           </a:p>
@@ -1655,7 +1641,7 @@
           <a:p>
             <a:fld id="{B088749B-5F51-9A42-930D-44F09B8F89B2}" type="slidenum">
               <a:rPr lang="de-DE" smtClean="0"/>
-              <a:t>‹Nr.›</a:t>
+              <a:t>‹#›</a:t>
             </a:fld>
             <a:endParaRPr lang="de-DE"/>
           </a:p>
@@ -1707,10 +1693,9 @@
           <a:lstStyle/>
           <a:p>
             <a:r>
-              <a:rPr lang="de-DE" smtClean="0"/>
+              <a:rPr lang="de-DE"/>
               <a:t>Mastertitelformat bearbeiten</a:t>
             </a:r>
-            <a:endParaRPr lang="de-DE"/>
           </a:p>
         </p:txBody>
       </p:sp>
@@ -1731,7 +1716,7 @@
           <a:p>
             <a:fld id="{94CE6F9C-8138-ED4D-AC4A-D3C3EB29335E}" type="datetimeFigureOut">
               <a:rPr lang="de-DE" smtClean="0"/>
-              <a:t>11.07.16</a:t>
+              <a:t>13.07.2016</a:t>
             </a:fld>
             <a:endParaRPr lang="de-DE"/>
           </a:p>
@@ -1773,7 +1758,7 @@
           <a:p>
             <a:fld id="{B088749B-5F51-9A42-930D-44F09B8F89B2}" type="slidenum">
               <a:rPr lang="de-DE" smtClean="0"/>
-              <a:t>‹Nr.›</a:t>
+              <a:t>‹#›</a:t>
             </a:fld>
             <a:endParaRPr lang="de-DE"/>
           </a:p>
@@ -1826,7 +1811,7 @@
           <a:p>
             <a:fld id="{94CE6F9C-8138-ED4D-AC4A-D3C3EB29335E}" type="datetimeFigureOut">
               <a:rPr lang="de-DE" smtClean="0"/>
-              <a:t>11.07.16</a:t>
+              <a:t>13.07.2016</a:t>
             </a:fld>
             <a:endParaRPr lang="de-DE"/>
           </a:p>
@@ -1868,7 +1853,7 @@
           <a:p>
             <a:fld id="{B088749B-5F51-9A42-930D-44F09B8F89B2}" type="slidenum">
               <a:rPr lang="de-DE" smtClean="0"/>
-              <a:t>‹Nr.›</a:t>
+              <a:t>‹#›</a:t>
             </a:fld>
             <a:endParaRPr lang="de-DE"/>
           </a:p>
@@ -1929,10 +1914,9 @@
           </a:lstStyle>
           <a:p>
             <a:r>
-              <a:rPr lang="de-DE" smtClean="0"/>
+              <a:rPr lang="de-DE"/>
               <a:t>Mastertitelformat bearbeiten</a:t>
             </a:r>
-            <a:endParaRPr lang="de-DE"/>
           </a:p>
         </p:txBody>
       </p:sp>
@@ -1986,38 +1970,37 @@
           <a:p>
             <a:pPr lvl="0"/>
             <a:r>
-              <a:rPr lang="de-DE" smtClean="0"/>
+              <a:rPr lang="de-DE"/>
               <a:t>Mastertextformat bearbeiten</a:t>
             </a:r>
           </a:p>
           <a:p>
             <a:pPr lvl="1"/>
             <a:r>
-              <a:rPr lang="de-DE" smtClean="0"/>
+              <a:rPr lang="de-DE"/>
               <a:t>Zweite Ebene</a:t>
             </a:r>
           </a:p>
           <a:p>
             <a:pPr lvl="2"/>
             <a:r>
-              <a:rPr lang="de-DE" smtClean="0"/>
+              <a:rPr lang="de-DE"/>
               <a:t>Dritte Ebene</a:t>
             </a:r>
           </a:p>
           <a:p>
             <a:pPr lvl="3"/>
             <a:r>
-              <a:rPr lang="de-DE" smtClean="0"/>
+              <a:rPr lang="de-DE"/>
               <a:t>Vierte Ebene</a:t>
             </a:r>
           </a:p>
           <a:p>
             <a:pPr lvl="4"/>
             <a:r>
-              <a:rPr lang="de-DE" smtClean="0"/>
+              <a:rPr lang="de-DE"/>
               <a:t>Fünfte Ebene</a:t>
             </a:r>
-            <a:endParaRPr lang="de-DE"/>
           </a:p>
         </p:txBody>
       </p:sp>
@@ -2080,7 +2063,7 @@
           <a:p>
             <a:pPr lvl="0"/>
             <a:r>
-              <a:rPr lang="de-DE" smtClean="0"/>
+              <a:rPr lang="de-DE"/>
               <a:t>Mastertextformat bearbeiten</a:t>
             </a:r>
           </a:p>
@@ -2103,7 +2086,7 @@
           <a:p>
             <a:fld id="{94CE6F9C-8138-ED4D-AC4A-D3C3EB29335E}" type="datetimeFigureOut">
               <a:rPr lang="de-DE" smtClean="0"/>
-              <a:t>11.07.16</a:t>
+              <a:t>13.07.2016</a:t>
             </a:fld>
             <a:endParaRPr lang="de-DE"/>
           </a:p>
@@ -2145,7 +2128,7 @@
           <a:p>
             <a:fld id="{B088749B-5F51-9A42-930D-44F09B8F89B2}" type="slidenum">
               <a:rPr lang="de-DE" smtClean="0"/>
-              <a:t>‹Nr.›</a:t>
+              <a:t>‹#›</a:t>
             </a:fld>
             <a:endParaRPr lang="de-DE"/>
           </a:p>
@@ -2206,10 +2189,9 @@
           </a:lstStyle>
           <a:p>
             <a:r>
-              <a:rPr lang="de-DE" smtClean="0"/>
+              <a:rPr lang="de-DE"/>
               <a:t>Mastertitelformat bearbeiten</a:t>
             </a:r>
-            <a:endParaRPr lang="de-DE"/>
           </a:p>
         </p:txBody>
       </p:sp>
@@ -2333,7 +2315,7 @@
           <a:p>
             <a:pPr lvl="0"/>
             <a:r>
-              <a:rPr lang="de-DE" smtClean="0"/>
+              <a:rPr lang="de-DE"/>
               <a:t>Mastertextformat bearbeiten</a:t>
             </a:r>
           </a:p>
@@ -2356,7 +2338,7 @@
           <a:p>
             <a:fld id="{94CE6F9C-8138-ED4D-AC4A-D3C3EB29335E}" type="datetimeFigureOut">
               <a:rPr lang="de-DE" smtClean="0"/>
-              <a:t>11.07.16</a:t>
+              <a:t>13.07.2016</a:t>
             </a:fld>
             <a:endParaRPr lang="de-DE"/>
           </a:p>
@@ -2398,7 +2380,7 @@
           <a:p>
             <a:fld id="{B088749B-5F51-9A42-930D-44F09B8F89B2}" type="slidenum">
               <a:rPr lang="de-DE" smtClean="0"/>
-              <a:t>‹Nr.›</a:t>
+              <a:t>‹#›</a:t>
             </a:fld>
             <a:endParaRPr lang="de-DE"/>
           </a:p>
@@ -2465,10 +2447,9 @@
           <a:lstStyle/>
           <a:p>
             <a:r>
-              <a:rPr lang="de-DE" smtClean="0"/>
+              <a:rPr lang="de-DE"/>
               <a:t>Mastertitelformat bearbeiten</a:t>
             </a:r>
-            <a:endParaRPr lang="de-DE"/>
           </a:p>
         </p:txBody>
       </p:sp>
@@ -2499,38 +2480,37 @@
           <a:p>
             <a:pPr lvl="0"/>
             <a:r>
-              <a:rPr lang="de-DE" smtClean="0"/>
+              <a:rPr lang="de-DE"/>
               <a:t>Mastertextformat bearbeiten</a:t>
             </a:r>
           </a:p>
           <a:p>
             <a:pPr lvl="1"/>
             <a:r>
-              <a:rPr lang="de-DE" smtClean="0"/>
+              <a:rPr lang="de-DE"/>
               <a:t>Zweite Ebene</a:t>
             </a:r>
           </a:p>
           <a:p>
             <a:pPr lvl="2"/>
             <a:r>
-              <a:rPr lang="de-DE" smtClean="0"/>
+              <a:rPr lang="de-DE"/>
               <a:t>Dritte Ebene</a:t>
             </a:r>
           </a:p>
           <a:p>
             <a:pPr lvl="3"/>
             <a:r>
-              <a:rPr lang="de-DE" smtClean="0"/>
+              <a:rPr lang="de-DE"/>
               <a:t>Vierte Ebene</a:t>
             </a:r>
           </a:p>
           <a:p>
             <a:pPr lvl="4"/>
             <a:r>
-              <a:rPr lang="de-DE" smtClean="0"/>
+              <a:rPr lang="de-DE"/>
               <a:t>Fünfte Ebene</a:t>
             </a:r>
-            <a:endParaRPr lang="de-DE"/>
           </a:p>
         </p:txBody>
       </p:sp>
@@ -2569,7 +2549,7 @@
           <a:p>
             <a:fld id="{94CE6F9C-8138-ED4D-AC4A-D3C3EB29335E}" type="datetimeFigureOut">
               <a:rPr lang="de-DE" smtClean="0"/>
-              <a:t>11.07.16</a:t>
+              <a:t>13.07.2016</a:t>
             </a:fld>
             <a:endParaRPr lang="de-DE"/>
           </a:p>
@@ -2647,7 +2627,7 @@
           <a:p>
             <a:fld id="{B088749B-5F51-9A42-930D-44F09B8F89B2}" type="slidenum">
               <a:rPr lang="de-DE" smtClean="0"/>
-              <a:t>‹Nr.›</a:t>
+              <a:t>‹#›</a:t>
             </a:fld>
             <a:endParaRPr lang="de-DE"/>
           </a:p>
@@ -3072,7 +3052,7 @@
               <a:p>
                 <a:pPr algn="ctr"/>
                 <a:r>
-                  <a:rPr lang="de-DE" sz="1200" dirty="0" smtClean="0">
+                  <a:rPr lang="de-DE" sz="1200" dirty="0">
                     <a:solidFill>
                       <a:schemeClr val="bg1"/>
                     </a:solidFill>
@@ -3117,7 +3097,7 @@
               <a:p>
                 <a:pPr algn="ctr"/>
                 <a:r>
-                  <a:rPr lang="de-DE" sz="2600" dirty="0" smtClean="0">
+                  <a:rPr lang="de-DE" sz="2600" dirty="0">
                     <a:solidFill>
                       <a:schemeClr val="bg1"/>
                     </a:solidFill>
@@ -3209,7 +3189,7 @@
           <a:lstStyle/>
           <a:p>
             <a:r>
-              <a:rPr lang="de-DE" sz="4800" dirty="0" smtClean="0">
+              <a:rPr lang="de-DE" sz="4800" dirty="0">
                 <a:solidFill>
                   <a:schemeClr val="bg1"/>
                 </a:solidFill>
@@ -3220,7 +3200,7 @@
               <a:t>Flappy </a:t>
             </a:r>
             <a:r>
-              <a:rPr lang="en-US" sz="4800" dirty="0" smtClean="0">
+              <a:rPr lang="en-US" sz="4800" dirty="0">
                 <a:solidFill>
                   <a:schemeClr val="bg1"/>
                 </a:solidFill>
@@ -3230,14 +3210,6 @@
               </a:rPr>
               <a:t>Penguin</a:t>
             </a:r>
-            <a:endParaRPr lang="en-US" sz="4800" dirty="0">
-              <a:solidFill>
-                <a:schemeClr val="bg1"/>
-              </a:solidFill>
-              <a:latin typeface="Corbel" charset="0"/>
-              <a:ea typeface="Corbel" charset="0"/>
-              <a:cs typeface="Corbel" charset="0"/>
-            </a:endParaRPr>
           </a:p>
         </p:txBody>
       </p:sp>
@@ -3401,13 +3373,6 @@
   <p:clrMapOvr>
     <a:masterClrMapping/>
   </p:clrMapOvr>
-  <p:timing>
-    <p:tnLst>
-      <p:par>
-        <p:cTn id="1" dur="indefinite" restart="never" nodeType="tmRoot"/>
-      </p:par>
-    </p:tnLst>
-  </p:timing>
 </p:sld>
 </file>
 
@@ -3683,7 +3648,7 @@
             <a:p>
               <a:pPr algn="ctr"/>
               <a:r>
-                <a:rPr lang="en-US" b="1" dirty="0" smtClean="0">
+                <a:rPr lang="en-US" b="1" dirty="0">
                   <a:solidFill>
                     <a:schemeClr val="bg1"/>
                   </a:solidFill>
@@ -3693,14 +3658,6 @@
                 </a:rPr>
                 <a:t>Don’t crash with an Ice Block!</a:t>
               </a:r>
-              <a:endParaRPr lang="en-US" b="1" dirty="0">
-                <a:solidFill>
-                  <a:schemeClr val="bg1"/>
-                </a:solidFill>
-                <a:latin typeface="Corbel" charset="0"/>
-                <a:ea typeface="Corbel" charset="0"/>
-                <a:cs typeface="Corbel" charset="0"/>
-              </a:endParaRPr>
             </a:p>
           </p:txBody>
         </p:sp>
@@ -3899,7 +3856,7 @@
             <a:p>
               <a:pPr algn="ctr"/>
               <a:r>
-                <a:rPr lang="en-US" sz="3600" dirty="0" smtClean="0">
+                <a:rPr lang="en-US" sz="3600" dirty="0">
                   <a:solidFill>
                     <a:schemeClr val="bg1"/>
                   </a:solidFill>
@@ -3909,14 +3866,6 @@
                 </a:rPr>
                 <a:t>Game Concept</a:t>
               </a:r>
-              <a:endParaRPr lang="en-US" sz="3600" dirty="0" smtClean="0">
-                <a:solidFill>
-                  <a:schemeClr val="bg1"/>
-                </a:solidFill>
-                <a:latin typeface="Corbel" charset="0"/>
-                <a:ea typeface="Corbel" charset="0"/>
-                <a:cs typeface="Corbel" charset="0"/>
-              </a:endParaRPr>
             </a:p>
           </p:txBody>
         </p:sp>
@@ -4410,13 +4359,6 @@
   <p:clrMapOvr>
     <a:masterClrMapping/>
   </p:clrMapOvr>
-  <p:timing>
-    <p:tnLst>
-      <p:par>
-        <p:cTn id="1" dur="indefinite" restart="never" nodeType="tmRoot"/>
-      </p:par>
-    </p:tnLst>
-  </p:timing>
 </p:sld>
 </file>
 
@@ -4507,7 +4449,7 @@
           <a:p>
             <a:pPr algn="ctr"/>
             <a:r>
-              <a:rPr lang="en-US" sz="3600" dirty="0" smtClean="0">
+              <a:rPr lang="en-US" sz="3600" dirty="0">
                 <a:solidFill>
                   <a:schemeClr val="bg1"/>
                 </a:solidFill>
@@ -4739,7 +4681,7 @@
           <a:lstStyle/>
           <a:p>
             <a:r>
-              <a:rPr lang="en-US" b="1" dirty="0" smtClean="0">
+              <a:rPr lang="en-US" b="1" dirty="0">
                 <a:solidFill>
                   <a:schemeClr val="bg1"/>
                 </a:solidFill>
@@ -4749,14 +4691,6 @@
               </a:rPr>
               <a:t>Integrating Stretch Sensor into Penguin Plush Toy</a:t>
             </a:r>
-            <a:endParaRPr lang="en-US" b="1" dirty="0">
-              <a:solidFill>
-                <a:schemeClr val="bg1"/>
-              </a:solidFill>
-              <a:latin typeface="Corbel" charset="0"/>
-              <a:ea typeface="Corbel" charset="0"/>
-              <a:cs typeface="Corbel" charset="0"/>
-            </a:endParaRPr>
           </a:p>
         </p:txBody>
       </p:sp>
@@ -4770,13 +4704,6 @@
   <p:clrMapOvr>
     <a:masterClrMapping/>
   </p:clrMapOvr>
-  <p:timing>
-    <p:tnLst>
-      <p:par>
-        <p:cTn id="1" dur="indefinite" restart="never" nodeType="tmRoot"/>
-      </p:par>
-    </p:tnLst>
-  </p:timing>
 </p:sld>
 </file>
 
@@ -4867,7 +4794,7 @@
           <a:p>
             <a:pPr algn="ctr"/>
             <a:r>
-              <a:rPr lang="en-US" sz="3600" dirty="0" smtClean="0">
+              <a:rPr lang="en-US" sz="3600" dirty="0">
                 <a:solidFill>
                   <a:schemeClr val="bg1"/>
                 </a:solidFill>
@@ -5026,13 +4953,6 @@
   <p:clrMapOvr>
     <a:masterClrMapping/>
   </p:clrMapOvr>
-  <p:timing>
-    <p:tnLst>
-      <p:par>
-        <p:cTn id="1" dur="indefinite" restart="never" nodeType="tmRoot"/>
-      </p:par>
-    </p:tnLst>
-  </p:timing>
 </p:sld>
 </file>
 
@@ -5123,7 +5043,7 @@
           <a:p>
             <a:pPr algn="ctr"/>
             <a:r>
-              <a:rPr lang="en-US" sz="3600" dirty="0" smtClean="0">
+              <a:rPr lang="en-US" sz="3600" dirty="0">
                 <a:solidFill>
                   <a:schemeClr val="bg1"/>
                 </a:solidFill>
@@ -5131,7 +5051,7 @@
                 <a:ea typeface="Corbel" charset="0"/>
                 <a:cs typeface="Corbel" charset="0"/>
               </a:rPr>
-              <a:t>Reinforcement Learning</a:t>
+              <a:t>Software Stack</a:t>
             </a:r>
           </a:p>
         </p:txBody>
@@ -5268,27 +5188,535 @@
           <a:lstStyle/>
           <a:p>
             <a:pPr algn="ctr"/>
-            <a:endParaRPr lang="de-DE"/>
+            <a:endParaRPr lang="en-US" dirty="0"/>
+          </a:p>
+        </p:txBody>
+      </p:sp>
+      <p:pic>
+        <p:nvPicPr>
+          <p:cNvPr id="2" name="Picture 1"/>
+          <p:cNvPicPr>
+            <a:picLocks noChangeAspect="1"/>
+          </p:cNvPicPr>
+          <p:nvPr/>
+        </p:nvPicPr>
+        <p:blipFill>
+          <a:blip r:embed="rId4"/>
+          <a:stretch>
+            <a:fillRect/>
+          </a:stretch>
+        </p:blipFill>
+        <p:spPr>
+          <a:xfrm>
+            <a:off x="1801969" y="3955556"/>
+            <a:ext cx="1237696" cy="1188188"/>
+          </a:xfrm>
+          <a:prstGeom prst="rect">
+            <a:avLst/>
+          </a:prstGeom>
+        </p:spPr>
+      </p:pic>
+      <p:pic>
+        <p:nvPicPr>
+          <p:cNvPr id="3" name="Picture 2"/>
+          <p:cNvPicPr>
+            <a:picLocks noChangeAspect="1"/>
+          </p:cNvPicPr>
+          <p:nvPr/>
+        </p:nvPicPr>
+        <p:blipFill>
+          <a:blip r:embed="rId5"/>
+          <a:stretch>
+            <a:fillRect/>
+          </a:stretch>
+        </p:blipFill>
+        <p:spPr>
+          <a:xfrm>
+            <a:off x="1365475" y="2592410"/>
+            <a:ext cx="2267800" cy="1133900"/>
+          </a:xfrm>
+          <a:prstGeom prst="rect">
+            <a:avLst/>
+          </a:prstGeom>
+        </p:spPr>
+      </p:pic>
+      <p:pic>
+        <p:nvPicPr>
+          <p:cNvPr id="5" name="Picture 4"/>
+          <p:cNvPicPr>
+            <a:picLocks noChangeAspect="1"/>
+          </p:cNvPicPr>
+          <p:nvPr/>
+        </p:nvPicPr>
+        <p:blipFill rotWithShape="1">
+          <a:blip r:embed="rId6"/>
+          <a:srcRect l="5265" t="35939" r="4808" b="8677"/>
+          <a:stretch/>
+        </p:blipFill>
+        <p:spPr>
+          <a:xfrm>
+            <a:off x="7635315" y="2770017"/>
+            <a:ext cx="3142358" cy="774125"/>
+          </a:xfrm>
+          <a:prstGeom prst="rect">
+            <a:avLst/>
+          </a:prstGeom>
+        </p:spPr>
+      </p:pic>
+      <p:pic>
+        <p:nvPicPr>
+          <p:cNvPr id="6" name="Picture 5"/>
+          <p:cNvPicPr>
+            <a:picLocks noChangeAspect="1"/>
+          </p:cNvPicPr>
+          <p:nvPr/>
+        </p:nvPicPr>
+        <p:blipFill>
+          <a:blip r:embed="rId7"/>
+          <a:stretch>
+            <a:fillRect/>
+          </a:stretch>
+        </p:blipFill>
+        <p:spPr>
+          <a:xfrm>
+            <a:off x="7979298" y="4083315"/>
+            <a:ext cx="2454391" cy="932669"/>
+          </a:xfrm>
+          <a:prstGeom prst="rect">
+            <a:avLst/>
+          </a:prstGeom>
+        </p:spPr>
+      </p:pic>
+      <p:sp>
+        <p:nvSpPr>
+          <p:cNvPr id="11" name="TextBox 10"/>
+          <p:cNvSpPr txBox="1"/>
+          <p:nvPr/>
+        </p:nvSpPr>
+        <p:spPr>
+          <a:xfrm>
+            <a:off x="1384292" y="1752600"/>
+            <a:ext cx="2073050" cy="523220"/>
+          </a:xfrm>
+          <a:prstGeom prst="rect">
+            <a:avLst/>
+          </a:prstGeom>
+          <a:noFill/>
+        </p:spPr>
+        <p:txBody>
+          <a:bodyPr wrap="square" rtlCol="0">
+            <a:spAutoFit/>
+          </a:bodyPr>
+          <a:lstStyle/>
+          <a:p>
+            <a:pPr algn="ctr"/>
+            <a:r>
+              <a:rPr lang="en-US" sz="2800" b="1" dirty="0"/>
+              <a:t>Backend</a:t>
+            </a:r>
+            <a:endParaRPr lang="de-DE" sz="2800" b="1" dirty="0"/>
+          </a:p>
+        </p:txBody>
+      </p:sp>
+      <p:sp>
+        <p:nvSpPr>
+          <p:cNvPr id="13" name="TextBox 12"/>
+          <p:cNvSpPr txBox="1"/>
+          <p:nvPr/>
+        </p:nvSpPr>
+        <p:spPr>
+          <a:xfrm>
+            <a:off x="8169969" y="1752600"/>
+            <a:ext cx="2073050" cy="523220"/>
+          </a:xfrm>
+          <a:prstGeom prst="rect">
+            <a:avLst/>
+          </a:prstGeom>
+          <a:noFill/>
+        </p:spPr>
+        <p:txBody>
+          <a:bodyPr wrap="square" rtlCol="0">
+            <a:spAutoFit/>
+          </a:bodyPr>
+          <a:lstStyle/>
+          <a:p>
+            <a:pPr algn="ctr"/>
+            <a:r>
+              <a:rPr lang="en-US" sz="2800" b="1" dirty="0"/>
+              <a:t>Frontend</a:t>
+            </a:r>
+            <a:endParaRPr lang="de-DE" sz="2800" b="1" dirty="0"/>
+          </a:p>
+        </p:txBody>
+      </p:sp>
+      <p:cxnSp>
+        <p:nvCxnSpPr>
+          <p:cNvPr id="15" name="Elbow Connector 14"/>
+          <p:cNvCxnSpPr>
+            <a:stCxn id="5" idx="3"/>
+            <a:endCxn id="5" idx="0"/>
+          </p:cNvCxnSpPr>
+          <p:nvPr/>
+        </p:nvCxnSpPr>
+        <p:spPr>
+          <a:xfrm flipH="1" flipV="1">
+            <a:off x="9206494" y="2770017"/>
+            <a:ext cx="1571179" cy="387063"/>
+          </a:xfrm>
+          <a:prstGeom prst="bentConnector4">
+            <a:avLst>
+              <a:gd name="adj1" fmla="val -18187"/>
+              <a:gd name="adj2" fmla="val 159060"/>
+            </a:avLst>
+          </a:prstGeom>
+          <a:ln>
+            <a:tailEnd type="triangle"/>
+          </a:ln>
+        </p:spPr>
+        <p:style>
+          <a:lnRef idx="1">
+            <a:schemeClr val="dk1"/>
+          </a:lnRef>
+          <a:fillRef idx="0">
+            <a:schemeClr val="dk1"/>
+          </a:fillRef>
+          <a:effectRef idx="0">
+            <a:schemeClr val="dk1"/>
+          </a:effectRef>
+          <a:fontRef idx="minor">
+            <a:schemeClr val="tx1"/>
+          </a:fontRef>
+        </p:style>
+      </p:cxnSp>
+      <p:sp>
+        <p:nvSpPr>
+          <p:cNvPr id="19" name="TextBox 18"/>
+          <p:cNvSpPr txBox="1"/>
+          <p:nvPr/>
+        </p:nvSpPr>
+        <p:spPr>
+          <a:xfrm>
+            <a:off x="9682982" y="2294445"/>
+            <a:ext cx="2189382" cy="276999"/>
+          </a:xfrm>
+          <a:prstGeom prst="rect">
+            <a:avLst/>
+          </a:prstGeom>
+          <a:noFill/>
+        </p:spPr>
+        <p:txBody>
+          <a:bodyPr wrap="none" rtlCol="0">
+            <a:spAutoFit/>
+          </a:bodyPr>
+          <a:lstStyle/>
+          <a:p>
+            <a:r>
+              <a:rPr lang="en-US" sz="1200" dirty="0"/>
+              <a:t>Synchronous Rendering Pipeline</a:t>
+            </a:r>
+            <a:endParaRPr lang="de-DE" sz="1200" dirty="0"/>
+          </a:p>
+        </p:txBody>
+      </p:sp>
+      <p:sp>
+        <p:nvSpPr>
+          <p:cNvPr id="22" name="TextBox 21"/>
+          <p:cNvSpPr txBox="1"/>
+          <p:nvPr/>
+        </p:nvSpPr>
+        <p:spPr>
+          <a:xfrm>
+            <a:off x="5956766" y="2825049"/>
+            <a:ext cx="1673600" cy="276999"/>
+          </a:xfrm>
+          <a:prstGeom prst="rect">
+            <a:avLst/>
+          </a:prstGeom>
+          <a:noFill/>
+        </p:spPr>
+        <p:txBody>
+          <a:bodyPr wrap="none" rtlCol="0">
+            <a:spAutoFit/>
+          </a:bodyPr>
+          <a:lstStyle/>
+          <a:p>
+            <a:pPr algn="r"/>
+            <a:r>
+              <a:rPr lang="en-US" sz="1200" dirty="0"/>
+              <a:t>Asynchronous Callbacks</a:t>
+            </a:r>
+            <a:endParaRPr lang="de-DE" sz="1200" dirty="0"/>
+          </a:p>
+        </p:txBody>
+      </p:sp>
+      <p:pic>
+        <p:nvPicPr>
+          <p:cNvPr id="23" name="Picture 22"/>
+          <p:cNvPicPr>
+            <a:picLocks noChangeAspect="1"/>
+          </p:cNvPicPr>
+          <p:nvPr/>
+        </p:nvPicPr>
+        <p:blipFill>
+          <a:blip r:embed="rId8"/>
+          <a:stretch>
+            <a:fillRect/>
+          </a:stretch>
+        </p:blipFill>
+        <p:spPr>
+          <a:xfrm>
+            <a:off x="5239007" y="4622527"/>
+            <a:ext cx="685800" cy="685800"/>
+          </a:xfrm>
+          <a:prstGeom prst="rect">
+            <a:avLst/>
+          </a:prstGeom>
+        </p:spPr>
+      </p:pic>
+      <p:sp>
+        <p:nvSpPr>
+          <p:cNvPr id="24" name="TextBox 23"/>
+          <p:cNvSpPr txBox="1"/>
+          <p:nvPr/>
+        </p:nvSpPr>
+        <p:spPr>
+          <a:xfrm>
+            <a:off x="4971804" y="4253195"/>
+            <a:ext cx="1220206" cy="369332"/>
+          </a:xfrm>
+          <a:prstGeom prst="rect">
+            <a:avLst/>
+          </a:prstGeom>
+          <a:noFill/>
+        </p:spPr>
+        <p:txBody>
+          <a:bodyPr wrap="none" rtlCol="0">
+            <a:spAutoFit/>
+          </a:bodyPr>
+          <a:lstStyle/>
+          <a:p>
+            <a:pPr algn="ctr"/>
+            <a:r>
+              <a:rPr lang="en-US" dirty="0"/>
+              <a:t>Q-Learning</a:t>
+            </a:r>
+            <a:endParaRPr lang="de-DE" dirty="0"/>
+          </a:p>
+        </p:txBody>
+      </p:sp>
+      <p:cxnSp>
+        <p:nvCxnSpPr>
+          <p:cNvPr id="30" name="Elbow Connector 29"/>
+          <p:cNvCxnSpPr>
+            <a:stCxn id="3" idx="3"/>
+            <a:endCxn id="5" idx="1"/>
+          </p:cNvCxnSpPr>
+          <p:nvPr/>
+        </p:nvCxnSpPr>
+        <p:spPr>
+          <a:xfrm flipV="1">
+            <a:off x="3633275" y="3157080"/>
+            <a:ext cx="4002040" cy="2280"/>
+          </a:xfrm>
+          <a:prstGeom prst="bentConnector3">
+            <a:avLst>
+              <a:gd name="adj1" fmla="val 50000"/>
+            </a:avLst>
+          </a:prstGeom>
+          <a:ln>
+            <a:solidFill>
+              <a:schemeClr val="tx1"/>
+            </a:solidFill>
+            <a:tailEnd type="triangle"/>
+          </a:ln>
+        </p:spPr>
+        <p:style>
+          <a:lnRef idx="1">
+            <a:schemeClr val="accent1"/>
+          </a:lnRef>
+          <a:fillRef idx="0">
+            <a:schemeClr val="accent1"/>
+          </a:fillRef>
+          <a:effectRef idx="0">
+            <a:schemeClr val="accent1"/>
+          </a:effectRef>
+          <a:fontRef idx="minor">
+            <a:schemeClr val="tx1"/>
+          </a:fontRef>
+        </p:style>
+      </p:cxnSp>
+      <p:sp>
+        <p:nvSpPr>
+          <p:cNvPr id="38" name="TextBox 37"/>
+          <p:cNvSpPr txBox="1"/>
+          <p:nvPr/>
+        </p:nvSpPr>
+        <p:spPr>
+          <a:xfrm>
+            <a:off x="3633275" y="2825049"/>
+            <a:ext cx="1579920" cy="276999"/>
+          </a:xfrm>
+          <a:prstGeom prst="rect">
+            <a:avLst/>
+          </a:prstGeom>
+          <a:noFill/>
+        </p:spPr>
+        <p:txBody>
+          <a:bodyPr wrap="none" rtlCol="0">
+            <a:spAutoFit/>
+          </a:bodyPr>
+          <a:lstStyle/>
+          <a:p>
+            <a:r>
+              <a:rPr lang="en-US" sz="1200" dirty="0"/>
+              <a:t>Detected User Actions</a:t>
+            </a:r>
+            <a:endParaRPr lang="de-DE" sz="1200" dirty="0"/>
+          </a:p>
+        </p:txBody>
+      </p:sp>
+      <p:cxnSp>
+        <p:nvCxnSpPr>
+          <p:cNvPr id="47" name="Straight Arrow Connector 46"/>
+          <p:cNvCxnSpPr/>
+          <p:nvPr/>
+        </p:nvCxnSpPr>
+        <p:spPr>
+          <a:xfrm flipV="1">
+            <a:off x="6192010" y="3544145"/>
+            <a:ext cx="1443305" cy="750865"/>
+          </a:xfrm>
+          <a:prstGeom prst="straightConnector1">
+            <a:avLst/>
+          </a:prstGeom>
+          <a:ln>
+            <a:headEnd type="triangle"/>
+            <a:tailEnd type="triangle"/>
+          </a:ln>
+        </p:spPr>
+        <p:style>
+          <a:lnRef idx="1">
+            <a:schemeClr val="dk1"/>
+          </a:lnRef>
+          <a:fillRef idx="0">
+            <a:schemeClr val="dk1"/>
+          </a:fillRef>
+          <a:effectRef idx="0">
+            <a:schemeClr val="dk1"/>
+          </a:effectRef>
+          <a:fontRef idx="minor">
+            <a:schemeClr val="tx1"/>
+          </a:fontRef>
+        </p:style>
+      </p:cxnSp>
+      <p:sp>
+        <p:nvSpPr>
+          <p:cNvPr id="53" name="TextBox 52"/>
+          <p:cNvSpPr txBox="1"/>
+          <p:nvPr/>
+        </p:nvSpPr>
+        <p:spPr>
+          <a:xfrm rot="19923602">
+            <a:off x="6384645" y="3699478"/>
+            <a:ext cx="770083" cy="276999"/>
+          </a:xfrm>
+          <a:prstGeom prst="rect">
+            <a:avLst/>
+          </a:prstGeom>
+          <a:noFill/>
+        </p:spPr>
+        <p:txBody>
+          <a:bodyPr wrap="none" rtlCol="0">
+            <a:spAutoFit/>
+          </a:bodyPr>
+          <a:lstStyle/>
+          <a:p>
+            <a:pPr algn="ctr"/>
+            <a:r>
+              <a:rPr lang="en-US" sz="1200" dirty="0"/>
+              <a:t>Enemy AI</a:t>
+            </a:r>
+            <a:endParaRPr lang="de-DE" sz="1200" dirty="0"/>
+          </a:p>
+        </p:txBody>
+      </p:sp>
+      <p:cxnSp>
+        <p:nvCxnSpPr>
+          <p:cNvPr id="56" name="Elbow Connector 55"/>
+          <p:cNvCxnSpPr>
+            <a:stCxn id="2" idx="1"/>
+            <a:endCxn id="3" idx="1"/>
+          </p:cNvCxnSpPr>
+          <p:nvPr/>
+        </p:nvCxnSpPr>
+        <p:spPr>
+          <a:xfrm rot="10800000">
+            <a:off x="1365475" y="3159360"/>
+            <a:ext cx="436494" cy="1390290"/>
+          </a:xfrm>
+          <a:prstGeom prst="bentConnector3">
+            <a:avLst>
+              <a:gd name="adj1" fmla="val 152372"/>
+            </a:avLst>
+          </a:prstGeom>
+          <a:ln>
+            <a:tailEnd type="triangle"/>
+          </a:ln>
+        </p:spPr>
+        <p:style>
+          <a:lnRef idx="1">
+            <a:schemeClr val="dk1"/>
+          </a:lnRef>
+          <a:fillRef idx="0">
+            <a:schemeClr val="dk1"/>
+          </a:fillRef>
+          <a:effectRef idx="0">
+            <a:schemeClr val="dk1"/>
+          </a:effectRef>
+          <a:fontRef idx="minor">
+            <a:schemeClr val="tx1"/>
+          </a:fontRef>
+        </p:style>
+      </p:cxnSp>
+      <p:sp>
+        <p:nvSpPr>
+          <p:cNvPr id="57" name="TextBox 56"/>
+          <p:cNvSpPr txBox="1"/>
+          <p:nvPr/>
+        </p:nvSpPr>
+        <p:spPr>
+          <a:xfrm>
+            <a:off x="765856" y="3414000"/>
+            <a:ext cx="369332" cy="881010"/>
+          </a:xfrm>
+          <a:prstGeom prst="rect">
+            <a:avLst/>
+          </a:prstGeom>
+          <a:noFill/>
+        </p:spPr>
+        <p:txBody>
+          <a:bodyPr vert="vert270" wrap="none" rtlCol="0">
+            <a:spAutoFit/>
+          </a:bodyPr>
+          <a:lstStyle/>
+          <a:p>
+            <a:r>
+              <a:rPr lang="en-US" sz="1200" dirty="0"/>
+              <a:t>Sensor Input</a:t>
+            </a:r>
           </a:p>
         </p:txBody>
       </p:sp>
     </p:spTree>
     <p:extLst>
       <p:ext uri="{BB962C8B-B14F-4D97-AF65-F5344CB8AC3E}">
-        <p14:creationId xmlns:p14="http://schemas.microsoft.com/office/powerpoint/2010/main" val="63530359"/>
+        <p14:creationId xmlns:p14="http://schemas.microsoft.com/office/powerpoint/2010/main" val="3607628298"/>
       </p:ext>
     </p:extLst>
   </p:cSld>
   <p:clrMapOvr>
     <a:masterClrMapping/>
   </p:clrMapOvr>
-  <p:timing>
-    <p:tnLst>
-      <p:par>
-        <p:cTn id="1" dur="indefinite" restart="never" nodeType="tmRoot"/>
-      </p:par>
-    </p:tnLst>
-  </p:timing>
 </p:sld>
 </file>
 
@@ -5379,7 +5807,7 @@
           <a:p>
             <a:pPr algn="ctr"/>
             <a:r>
-              <a:rPr lang="en-US" sz="3600" dirty="0" smtClean="0">
+              <a:rPr lang="en-US" sz="3600" dirty="0">
                 <a:solidFill>
                   <a:schemeClr val="bg1"/>
                 </a:solidFill>
@@ -5387,16 +5815,8 @@
                 <a:ea typeface="Corbel" charset="0"/>
                 <a:cs typeface="Corbel" charset="0"/>
               </a:rPr>
-              <a:t>Outlook</a:t>
-            </a:r>
-            <a:endParaRPr lang="en-US" sz="3600" dirty="0" smtClean="0">
-              <a:solidFill>
-                <a:schemeClr val="bg1"/>
-              </a:solidFill>
-              <a:latin typeface="Corbel" charset="0"/>
-              <a:ea typeface="Corbel" charset="0"/>
-              <a:cs typeface="Corbel" charset="0"/>
-            </a:endParaRPr>
+              <a:t>Reinforcement Learning</a:t>
+            </a:r>
           </a:p>
         </p:txBody>
       </p:sp>
@@ -5539,6 +5959,255 @@
     </p:spTree>
     <p:extLst>
       <p:ext uri="{BB962C8B-B14F-4D97-AF65-F5344CB8AC3E}">
+        <p14:creationId xmlns:p14="http://schemas.microsoft.com/office/powerpoint/2010/main" val="63530359"/>
+      </p:ext>
+    </p:extLst>
+  </p:cSld>
+  <p:clrMapOvr>
+    <a:masterClrMapping/>
+  </p:clrMapOvr>
+</p:sld>
+</file>
+
+<file path=ppt/slides/slide7.xml><?xml version="1.0" encoding="utf-8"?>
+<p:sld xmlns:a="http://schemas.openxmlformats.org/drawingml/2006/main" xmlns:r="http://schemas.openxmlformats.org/officeDocument/2006/relationships" xmlns:p="http://schemas.openxmlformats.org/presentationml/2006/main">
+  <p:cSld>
+    <p:spTree>
+      <p:nvGrpSpPr>
+        <p:cNvPr id="1" name=""/>
+        <p:cNvGrpSpPr/>
+        <p:nvPr/>
+      </p:nvGrpSpPr>
+      <p:grpSpPr>
+        <a:xfrm>
+          <a:off x="0" y="0"/>
+          <a:ext cx="0" cy="0"/>
+          <a:chOff x="0" y="0"/>
+          <a:chExt cx="0" cy="0"/>
+        </a:xfrm>
+      </p:grpSpPr>
+      <p:sp>
+        <p:nvSpPr>
+          <p:cNvPr id="4" name="Rechteck 3"/>
+          <p:cNvSpPr/>
+          <p:nvPr/>
+        </p:nvSpPr>
+        <p:spPr>
+          <a:xfrm>
+            <a:off x="2441007" y="97443"/>
+            <a:ext cx="6534000" cy="1149464"/>
+          </a:xfrm>
+          <a:prstGeom prst="rect">
+            <a:avLst/>
+          </a:prstGeom>
+          <a:solidFill>
+            <a:srgbClr val="5B7CB6"/>
+          </a:solidFill>
+          <a:ln>
+            <a:noFill/>
+          </a:ln>
+        </p:spPr>
+        <p:style>
+          <a:lnRef idx="2">
+            <a:schemeClr val="accent1">
+              <a:shade val="50000"/>
+            </a:schemeClr>
+          </a:lnRef>
+          <a:fillRef idx="1">
+            <a:schemeClr val="accent1"/>
+          </a:fillRef>
+          <a:effectRef idx="0">
+            <a:schemeClr val="accent1"/>
+          </a:effectRef>
+          <a:fontRef idx="minor">
+            <a:schemeClr val="lt1"/>
+          </a:fontRef>
+        </p:style>
+        <p:txBody>
+          <a:bodyPr rtlCol="0" anchor="ctr"/>
+          <a:lstStyle/>
+          <a:p>
+            <a:pPr algn="ctr"/>
+            <a:endParaRPr lang="en-US" dirty="0"/>
+          </a:p>
+        </p:txBody>
+      </p:sp>
+      <p:sp>
+        <p:nvSpPr>
+          <p:cNvPr id="7" name="Textfeld 6"/>
+          <p:cNvSpPr txBox="1"/>
+          <p:nvPr/>
+        </p:nvSpPr>
+        <p:spPr>
+          <a:xfrm>
+            <a:off x="2701636" y="349009"/>
+            <a:ext cx="6040582" cy="646331"/>
+          </a:xfrm>
+          <a:prstGeom prst="rect">
+            <a:avLst/>
+          </a:prstGeom>
+          <a:noFill/>
+        </p:spPr>
+        <p:txBody>
+          <a:bodyPr wrap="square" rtlCol="0">
+            <a:spAutoFit/>
+          </a:bodyPr>
+          <a:lstStyle/>
+          <a:p>
+            <a:pPr algn="ctr"/>
+            <a:r>
+              <a:rPr lang="en-US" sz="3600" dirty="0">
+                <a:solidFill>
+                  <a:schemeClr val="bg1"/>
+                </a:solidFill>
+                <a:latin typeface="Corbel" charset="0"/>
+                <a:ea typeface="Corbel" charset="0"/>
+                <a:cs typeface="Corbel" charset="0"/>
+              </a:rPr>
+              <a:t>Outlook</a:t>
+            </a:r>
+          </a:p>
+        </p:txBody>
+      </p:sp>
+      <p:pic>
+        <p:nvPicPr>
+          <p:cNvPr id="8" name="Bild 7"/>
+          <p:cNvPicPr>
+            <a:picLocks noChangeAspect="1"/>
+          </p:cNvPicPr>
+          <p:nvPr/>
+        </p:nvPicPr>
+        <p:blipFill>
+          <a:blip r:embed="rId2">
+            <a:extLst>
+              <a:ext uri="{28A0092B-C50C-407E-A947-70E740481C1C}">
+                <a14:useLocalDpi xmlns:a14="http://schemas.microsoft.com/office/drawing/2010/main" val="0"/>
+              </a:ext>
+            </a:extLst>
+          </a:blip>
+          <a:stretch>
+            <a:fillRect/>
+          </a:stretch>
+        </p:blipFill>
+        <p:spPr>
+          <a:xfrm>
+            <a:off x="111136" y="97448"/>
+            <a:ext cx="2299129" cy="1149459"/>
+          </a:xfrm>
+          <a:prstGeom prst="rect">
+            <a:avLst/>
+          </a:prstGeom>
+        </p:spPr>
+      </p:pic>
+      <p:pic>
+        <p:nvPicPr>
+          <p:cNvPr id="9" name="Bild 8"/>
+          <p:cNvPicPr>
+            <a:picLocks noChangeAspect="1"/>
+          </p:cNvPicPr>
+          <p:nvPr/>
+        </p:nvPicPr>
+        <p:blipFill>
+          <a:blip r:embed="rId2">
+            <a:extLst>
+              <a:ext uri="{28A0092B-C50C-407E-A947-70E740481C1C}">
+                <a14:useLocalDpi xmlns:a14="http://schemas.microsoft.com/office/drawing/2010/main" val="0"/>
+              </a:ext>
+            </a:extLst>
+          </a:blip>
+          <a:stretch>
+            <a:fillRect/>
+          </a:stretch>
+        </p:blipFill>
+        <p:spPr>
+          <a:xfrm>
+            <a:off x="9002847" y="97444"/>
+            <a:ext cx="3092171" cy="1149464"/>
+          </a:xfrm>
+          <a:prstGeom prst="rect">
+            <a:avLst/>
+          </a:prstGeom>
+        </p:spPr>
+      </p:pic>
+      <p:pic>
+        <p:nvPicPr>
+          <p:cNvPr id="10" name="Bild 9"/>
+          <p:cNvPicPr>
+            <a:picLocks noChangeAspect="1"/>
+          </p:cNvPicPr>
+          <p:nvPr/>
+        </p:nvPicPr>
+        <p:blipFill>
+          <a:blip r:embed="rId3">
+            <a:extLst>
+              <a:ext uri="{28A0092B-C50C-407E-A947-70E740481C1C}">
+                <a14:useLocalDpi xmlns:a14="http://schemas.microsoft.com/office/drawing/2010/main" val="0"/>
+              </a:ext>
+            </a:extLst>
+          </a:blip>
+          <a:stretch>
+            <a:fillRect/>
+          </a:stretch>
+        </p:blipFill>
+        <p:spPr>
+          <a:xfrm>
+            <a:off x="6317970" y="5841380"/>
+            <a:ext cx="5777048" cy="909708"/>
+          </a:xfrm>
+          <a:prstGeom prst="rect">
+            <a:avLst/>
+          </a:prstGeom>
+        </p:spPr>
+      </p:pic>
+      <p:sp>
+        <p:nvSpPr>
+          <p:cNvPr id="12" name="Rechteck 11"/>
+          <p:cNvSpPr/>
+          <p:nvPr/>
+        </p:nvSpPr>
+        <p:spPr>
+          <a:xfrm>
+            <a:off x="111136" y="5841380"/>
+            <a:ext cx="6174000" cy="909708"/>
+          </a:xfrm>
+          <a:prstGeom prst="rect">
+            <a:avLst/>
+          </a:prstGeom>
+          <a:solidFill>
+            <a:srgbClr val="2894D9"/>
+          </a:solidFill>
+          <a:ln>
+            <a:noFill/>
+          </a:ln>
+        </p:spPr>
+        <p:style>
+          <a:lnRef idx="2">
+            <a:schemeClr val="accent1">
+              <a:shade val="50000"/>
+            </a:schemeClr>
+          </a:lnRef>
+          <a:fillRef idx="1">
+            <a:schemeClr val="accent1"/>
+          </a:fillRef>
+          <a:effectRef idx="0">
+            <a:schemeClr val="accent1"/>
+          </a:effectRef>
+          <a:fontRef idx="minor">
+            <a:schemeClr val="lt1"/>
+          </a:fontRef>
+        </p:style>
+        <p:txBody>
+          <a:bodyPr rtlCol="0" anchor="ctr"/>
+          <a:lstStyle/>
+          <a:p>
+            <a:pPr algn="ctr"/>
+            <a:endParaRPr lang="de-DE"/>
+          </a:p>
+        </p:txBody>
+      </p:sp>
+    </p:spTree>
+    <p:extLst>
+      <p:ext uri="{BB962C8B-B14F-4D97-AF65-F5344CB8AC3E}">
         <p14:creationId xmlns:p14="http://schemas.microsoft.com/office/powerpoint/2010/main" val="1377222670"/>
       </p:ext>
     </p:extLst>
@@ -5546,13 +6215,6 @@
   <p:clrMapOvr>
     <a:masterClrMapping/>
   </p:clrMapOvr>
-  <p:timing>
-    <p:tnLst>
-      <p:par>
-        <p:cTn id="1" dur="indefinite" restart="never" nodeType="tmRoot"/>
-      </p:par>
-    </p:tnLst>
-  </p:timing>
 </p:sld>
 </file>
 

</xml_diff>